<commit_message>
Added slides for data sharing with ECAS.
</commit_message>
<xml_diff>
--- a/egu_2019/slides/ecas_presentation_egu19.pptx
+++ b/egu_2019/slides/ecas_presentation_egu19.pptx
@@ -18,6 +18,9 @@
     <p:sldId id="263" r:id="rId13"/>
     <p:sldId id="264" r:id="rId14"/>
     <p:sldId id="265" r:id="rId15"/>
+    <p:sldId id="266" r:id="rId16"/>
+    <p:sldId id="267" r:id="rId17"/>
+    <p:sldId id="268" r:id="rId18"/>
   </p:sldIdLst>
   <p:sldSz cx="9144000" cy="6858000"/>
   <p:notesSz cx="7559675" cy="10691812"/>
@@ -5388,7 +5391,7 @@
         <p:spPr>
           <a:xfrm>
             <a:off x="1726560" y="4833000"/>
-            <a:ext cx="1416600" cy="363960"/>
+            <a:ext cx="1415880" cy="363240"/>
           </a:xfrm>
           <a:prstGeom prst="rect">
             <a:avLst/>
@@ -5441,7 +5444,7 @@
         <p:spPr>
           <a:xfrm>
             <a:off x="1291320" y="4705920"/>
-            <a:ext cx="588600" cy="577800"/>
+            <a:ext cx="587880" cy="577080"/>
           </a:xfrm>
           <a:prstGeom prst="rect">
             <a:avLst/>
@@ -5464,7 +5467,7 @@
         <p:spPr>
           <a:xfrm>
             <a:off x="1259640" y="5097600"/>
-            <a:ext cx="643680" cy="632160"/>
+            <a:ext cx="642960" cy="631440"/>
           </a:xfrm>
           <a:prstGeom prst="rect">
             <a:avLst/>
@@ -5483,7 +5486,7 @@
         <p:spPr>
           <a:xfrm>
             <a:off x="1712160" y="5228640"/>
-            <a:ext cx="1623960" cy="363960"/>
+            <a:ext cx="1623240" cy="363240"/>
           </a:xfrm>
           <a:prstGeom prst="rect">
             <a:avLst/>
@@ -5532,7 +5535,7 @@
         <p:spPr>
           <a:xfrm>
             <a:off x="755640" y="6381360"/>
-            <a:ext cx="8280000" cy="215280"/>
+            <a:ext cx="8279280" cy="214560"/>
           </a:xfrm>
           <a:prstGeom prst="rect">
             <a:avLst/>
@@ -5585,7 +5588,7 @@
         <p:spPr>
           <a:xfrm>
             <a:off x="179640" y="6381360"/>
-            <a:ext cx="421200" cy="280800"/>
+            <a:ext cx="420480" cy="280080"/>
           </a:xfrm>
           <a:prstGeom prst="rect">
             <a:avLst/>
@@ -5636,7 +5639,7 @@
         <p:spPr>
           <a:xfrm>
             <a:off x="1281960" y="1247400"/>
-            <a:ext cx="4915080" cy="1222920"/>
+            <a:ext cx="4914360" cy="1222200"/>
           </a:xfrm>
           <a:prstGeom prst="rect">
             <a:avLst/>
@@ -5659,7 +5662,7 @@
         <p:spPr>
           <a:xfrm>
             <a:off x="457200" y="273600"/>
-            <a:ext cx="8228880" cy="1144440"/>
+            <a:ext cx="8229240" cy="1144800"/>
           </a:xfrm>
           <a:prstGeom prst="rect">
             <a:avLst/>
@@ -5668,13 +5671,14 @@
         <p:txBody>
           <a:bodyPr lIns="0" rIns="0" tIns="0" bIns="0" anchor="ctr"/>
           <a:p>
-            <a:r>
-              <a:rPr b="0" lang="de-DE" sz="1800" spc="-1" strike="noStrike">
+            <a:pPr algn="ctr"/>
+            <a:r>
+              <a:rPr b="0" lang="de-DE" sz="4400" spc="-1" strike="noStrike">
                 <a:latin typeface="Arial"/>
               </a:rPr>
               <a:t>Click to edit the title text format</a:t>
             </a:r>
-            <a:endParaRPr b="0" lang="de-DE" sz="1800" spc="-1" strike="noStrike">
+            <a:endParaRPr b="0" lang="de-DE" sz="4400" spc="-1" strike="noStrike">
               <a:latin typeface="Arial"/>
             </a:endParaRPr>
           </a:p>
@@ -5693,7 +5697,7 @@
         <p:spPr>
           <a:xfrm>
             <a:off x="457200" y="1604520"/>
-            <a:ext cx="8228880" cy="3976920"/>
+            <a:ext cx="8229240" cy="3977280"/>
           </a:xfrm>
           <a:prstGeom prst="rect">
             <a:avLst/>
@@ -5716,12 +5720,12 @@
               <a:buChar char=""/>
             </a:pPr>
             <a:r>
-              <a:rPr b="0" lang="de-DE" sz="1800" spc="-1" strike="noStrike">
+              <a:rPr b="0" lang="de-DE" sz="3200" spc="-1" strike="noStrike">
                 <a:latin typeface="Arial"/>
               </a:rPr>
               <a:t>Click to edit the outline text format</a:t>
             </a:r>
-            <a:endParaRPr b="0" lang="de-DE" sz="1800" spc="-1" strike="noStrike">
+            <a:endParaRPr b="0" lang="de-DE" sz="3200" spc="-1" strike="noStrike">
               <a:latin typeface="Arial"/>
             </a:endParaRPr>
           </a:p>
@@ -5738,12 +5742,12 @@
               <a:buChar char=""/>
             </a:pPr>
             <a:r>
-              <a:rPr b="0" lang="de-DE" sz="1800" spc="-1" strike="noStrike">
+              <a:rPr b="0" lang="de-DE" sz="2800" spc="-1" strike="noStrike">
                 <a:latin typeface="Arial"/>
               </a:rPr>
               <a:t>Second Outline Level</a:t>
             </a:r>
-            <a:endParaRPr b="0" lang="de-DE" sz="1800" spc="-1" strike="noStrike">
+            <a:endParaRPr b="0" lang="de-DE" sz="2800" spc="-1" strike="noStrike">
               <a:latin typeface="Arial"/>
             </a:endParaRPr>
           </a:p>
@@ -5760,12 +5764,12 @@
               <a:buChar char=""/>
             </a:pPr>
             <a:r>
-              <a:rPr b="0" lang="de-DE" sz="1800" spc="-1" strike="noStrike">
+              <a:rPr b="0" lang="de-DE" sz="2400" spc="-1" strike="noStrike">
                 <a:latin typeface="Arial"/>
               </a:rPr>
               <a:t>Third Outline Level</a:t>
             </a:r>
-            <a:endParaRPr b="0" lang="de-DE" sz="1800" spc="-1" strike="noStrike">
+            <a:endParaRPr b="0" lang="de-DE" sz="2400" spc="-1" strike="noStrike">
               <a:latin typeface="Arial"/>
             </a:endParaRPr>
           </a:p>
@@ -5782,12 +5786,12 @@
               <a:buChar char=""/>
             </a:pPr>
             <a:r>
-              <a:rPr b="0" lang="de-DE" sz="1800" spc="-1" strike="noStrike">
+              <a:rPr b="0" lang="de-DE" sz="2000" spc="-1" strike="noStrike">
                 <a:latin typeface="Arial"/>
               </a:rPr>
               <a:t>Fourth Outline Level</a:t>
             </a:r>
-            <a:endParaRPr b="0" lang="de-DE" sz="1800" spc="-1" strike="noStrike">
+            <a:endParaRPr b="0" lang="de-DE" sz="2000" spc="-1" strike="noStrike">
               <a:latin typeface="Arial"/>
             </a:endParaRPr>
           </a:p>
@@ -5804,12 +5808,12 @@
               <a:buChar char=""/>
             </a:pPr>
             <a:r>
-              <a:rPr b="0" lang="de-DE" sz="1800" spc="-1" strike="noStrike">
+              <a:rPr b="0" lang="de-DE" sz="2000" spc="-1" strike="noStrike">
                 <a:latin typeface="Arial"/>
               </a:rPr>
               <a:t>Fifth Outline Level</a:t>
             </a:r>
-            <a:endParaRPr b="0" lang="de-DE" sz="1800" spc="-1" strike="noStrike">
+            <a:endParaRPr b="0" lang="de-DE" sz="2000" spc="-1" strike="noStrike">
               <a:latin typeface="Arial"/>
             </a:endParaRPr>
           </a:p>
@@ -5826,12 +5830,12 @@
               <a:buChar char=""/>
             </a:pPr>
             <a:r>
-              <a:rPr b="0" lang="de-DE" sz="1800" spc="-1" strike="noStrike">
+              <a:rPr b="0" lang="de-DE" sz="2000" spc="-1" strike="noStrike">
                 <a:latin typeface="Arial"/>
               </a:rPr>
               <a:t>Sixth Outline Level</a:t>
             </a:r>
-            <a:endParaRPr b="0" lang="de-DE" sz="1800" spc="-1" strike="noStrike">
+            <a:endParaRPr b="0" lang="de-DE" sz="2000" spc="-1" strike="noStrike">
               <a:latin typeface="Arial"/>
             </a:endParaRPr>
           </a:p>
@@ -5848,12 +5852,12 @@
               <a:buChar char=""/>
             </a:pPr>
             <a:r>
-              <a:rPr b="0" lang="de-DE" sz="1800" spc="-1" strike="noStrike">
+              <a:rPr b="0" lang="de-DE" sz="2000" spc="-1" strike="noStrike">
                 <a:latin typeface="Arial"/>
               </a:rPr>
               <a:t>Seventh Outline Level</a:t>
             </a:r>
-            <a:endParaRPr b="0" lang="de-DE" sz="1800" spc="-1" strike="noStrike">
+            <a:endParaRPr b="0" lang="de-DE" sz="2000" spc="-1" strike="noStrike">
               <a:latin typeface="Arial"/>
             </a:endParaRPr>
           </a:p>
@@ -5943,7 +5947,7 @@
         <p:spPr>
           <a:xfrm>
             <a:off x="8449920" y="6381360"/>
-            <a:ext cx="441360" cy="291960"/>
+            <a:ext cx="440640" cy="291240"/>
           </a:xfrm>
           <a:prstGeom prst="rect">
             <a:avLst/>
@@ -5980,7 +5984,7 @@
         <p:spPr>
           <a:xfrm>
             <a:off x="5035680" y="0"/>
-            <a:ext cx="1302480" cy="55440"/>
+            <a:ext cx="1301760" cy="54720"/>
           </a:xfrm>
           <a:prstGeom prst="rect">
             <a:avLst/>
@@ -6015,7 +6019,7 @@
         <p:spPr>
           <a:xfrm>
             <a:off x="7878600" y="-2520"/>
-            <a:ext cx="1141920" cy="44640"/>
+            <a:ext cx="1141200" cy="43920"/>
           </a:xfrm>
           <a:prstGeom prst="rect">
             <a:avLst/>
@@ -6050,7 +6054,7 @@
         <p:spPr>
           <a:xfrm>
             <a:off x="6381360" y="0"/>
-            <a:ext cx="1600200" cy="50400"/>
+            <a:ext cx="1599480" cy="49680"/>
           </a:xfrm>
           <a:prstGeom prst="rect">
             <a:avLst/>
@@ -6085,7 +6089,7 @@
         <p:spPr>
           <a:xfrm>
             <a:off x="0" y="0"/>
-            <a:ext cx="642600" cy="50400"/>
+            <a:ext cx="641880" cy="49680"/>
           </a:xfrm>
           <a:prstGeom prst="rect">
             <a:avLst/>
@@ -6124,7 +6128,7 @@
         <p:spPr>
           <a:xfrm>
             <a:off x="0" y="6813720"/>
-            <a:ext cx="9142920" cy="43200"/>
+            <a:ext cx="9142200" cy="42480"/>
           </a:xfrm>
           <a:prstGeom prst="rect">
             <a:avLst/>
@@ -6432,7 +6436,7 @@
         <p:spPr>
           <a:xfrm>
             <a:off x="8449920" y="6381360"/>
-            <a:ext cx="441360" cy="291960"/>
+            <a:ext cx="440640" cy="291240"/>
           </a:xfrm>
           <a:prstGeom prst="rect">
             <a:avLst/>
@@ -6469,7 +6473,7 @@
         <p:spPr>
           <a:xfrm>
             <a:off x="5035680" y="0"/>
-            <a:ext cx="1302480" cy="55440"/>
+            <a:ext cx="1301760" cy="54720"/>
           </a:xfrm>
           <a:prstGeom prst="rect">
             <a:avLst/>
@@ -6504,7 +6508,7 @@
         <p:spPr>
           <a:xfrm>
             <a:off x="7878600" y="-2520"/>
-            <a:ext cx="1141920" cy="44640"/>
+            <a:ext cx="1141200" cy="43920"/>
           </a:xfrm>
           <a:prstGeom prst="rect">
             <a:avLst/>
@@ -6539,7 +6543,7 @@
         <p:spPr>
           <a:xfrm>
             <a:off x="6381360" y="0"/>
-            <a:ext cx="1600200" cy="50400"/>
+            <a:ext cx="1599480" cy="49680"/>
           </a:xfrm>
           <a:prstGeom prst="rect">
             <a:avLst/>
@@ -6574,7 +6578,7 @@
         <p:spPr>
           <a:xfrm>
             <a:off x="0" y="0"/>
-            <a:ext cx="642600" cy="50400"/>
+            <a:ext cx="641880" cy="49680"/>
           </a:xfrm>
           <a:prstGeom prst="rect">
             <a:avLst/>
@@ -6613,7 +6617,7 @@
         <p:spPr>
           <a:xfrm>
             <a:off x="0" y="6813720"/>
-            <a:ext cx="9142920" cy="43200"/>
+            <a:ext cx="9142200" cy="42480"/>
           </a:xfrm>
           <a:prstGeom prst="rect">
             <a:avLst/>
@@ -6893,9 +6897,9 @@
         <p:grpSpPr>
           <a:xfrm>
             <a:off x="2703600" y="5184000"/>
-            <a:ext cx="3735720" cy="632160"/>
+            <a:ext cx="3735000" cy="631440"/>
             <a:chOff x="2703600" y="5184000"/>
-            <a:chExt cx="3735720" cy="632160"/>
+            <a:chExt cx="3735000" cy="631440"/>
           </a:xfrm>
         </p:grpSpPr>
         <p:sp>
@@ -6907,7 +6911,7 @@
           <p:spPr>
             <a:xfrm>
               <a:off x="3056040" y="5300640"/>
-              <a:ext cx="1510920" cy="394560"/>
+              <a:ext cx="1510200" cy="393840"/>
             </a:xfrm>
             <a:prstGeom prst="rect">
               <a:avLst/>
@@ -6960,7 +6964,7 @@
           <p:spPr>
             <a:xfrm>
               <a:off x="2703600" y="5211000"/>
-              <a:ext cx="588600" cy="577800"/>
+              <a:ext cx="587880" cy="577080"/>
             </a:xfrm>
             <a:prstGeom prst="rect">
               <a:avLst/>
@@ -6983,7 +6987,7 @@
           <p:spPr>
             <a:xfrm>
               <a:off x="4496040" y="5184000"/>
-              <a:ext cx="643680" cy="632160"/>
+              <a:ext cx="642960" cy="631440"/>
             </a:xfrm>
             <a:prstGeom prst="rect">
               <a:avLst/>
@@ -7002,7 +7006,7 @@
           <p:spPr>
             <a:xfrm>
               <a:off x="4928400" y="5300640"/>
-              <a:ext cx="1510920" cy="394560"/>
+              <a:ext cx="1510200" cy="393840"/>
             </a:xfrm>
             <a:prstGeom prst="rect">
               <a:avLst/>
@@ -7056,7 +7060,7 @@
         <p:spPr>
           <a:xfrm>
             <a:off x="3679560" y="2727360"/>
-            <a:ext cx="1783800" cy="2230200"/>
+            <a:ext cx="1783080" cy="2229480"/>
           </a:xfrm>
           <a:prstGeom prst="rect">
             <a:avLst/>
@@ -7075,7 +7079,7 @@
         <p:spPr>
           <a:xfrm>
             <a:off x="899640" y="1326960"/>
-            <a:ext cx="3095280" cy="942840"/>
+            <a:ext cx="3094560" cy="942120"/>
           </a:xfrm>
           <a:prstGeom prst="rect">
             <a:avLst/>
@@ -7144,7 +7148,7 @@
         <p:spPr>
           <a:xfrm>
             <a:off x="899640" y="2541960"/>
-            <a:ext cx="2915280" cy="295200"/>
+            <a:ext cx="2914560" cy="294480"/>
           </a:xfrm>
           <a:prstGeom prst="rect">
             <a:avLst/>
@@ -7221,9 +7225,9 @@
         <p:grpSpPr>
           <a:xfrm>
             <a:off x="719280" y="6271560"/>
-            <a:ext cx="7704360" cy="293400"/>
+            <a:ext cx="7703640" cy="292680"/>
             <a:chOff x="719280" y="6271560"/>
-            <a:chExt cx="7704360" cy="293400"/>
+            <a:chExt cx="7703640" cy="292680"/>
           </a:xfrm>
         </p:grpSpPr>
         <p:pic>
@@ -7239,7 +7243,7 @@
           <p:spPr>
             <a:xfrm>
               <a:off x="719280" y="6271560"/>
-              <a:ext cx="841680" cy="293400"/>
+              <a:ext cx="840960" cy="292680"/>
             </a:xfrm>
             <a:prstGeom prst="rect">
               <a:avLst/>
@@ -7262,7 +7266,7 @@
           <p:spPr>
             <a:xfrm>
               <a:off x="1632600" y="6349320"/>
-              <a:ext cx="6791040" cy="215640"/>
+              <a:ext cx="6790320" cy="214920"/>
             </a:xfrm>
             <a:prstGeom prst="rect">
               <a:avLst/>
@@ -7533,7 +7537,7 @@
         <p:spPr>
           <a:xfrm>
             <a:off x="864000" y="2664360"/>
-            <a:ext cx="8495280" cy="574920"/>
+            <a:ext cx="8494560" cy="574200"/>
           </a:xfrm>
           <a:prstGeom prst="rect">
             <a:avLst/>
@@ -7582,7 +7586,7 @@
         <p:spPr>
           <a:xfrm>
             <a:off x="864000" y="3600000"/>
-            <a:ext cx="8171640" cy="574920"/>
+            <a:ext cx="8170920" cy="574200"/>
           </a:xfrm>
           <a:prstGeom prst="rect">
             <a:avLst/>
@@ -7821,7 +7825,7 @@
         <p:spPr>
           <a:xfrm>
             <a:off x="1368000" y="5544000"/>
-            <a:ext cx="5777640" cy="333000"/>
+            <a:ext cx="5776920" cy="332280"/>
           </a:xfrm>
           <a:prstGeom prst="rect">
             <a:avLst/>
@@ -7929,7 +7933,7 @@
         <p:spPr>
           <a:xfrm>
             <a:off x="6553080" y="6381360"/>
-            <a:ext cx="2338200" cy="286920"/>
+            <a:ext cx="2337480" cy="286200"/>
           </a:xfrm>
           <a:prstGeom prst="rect">
             <a:avLst/>
@@ -7953,7 +7957,7 @@
                 <a:spcPct val="100000"/>
               </a:lnSpc>
             </a:pPr>
-            <a:fld id="{90D6CF5D-C2B0-4498-BD91-24FF3C80FA68}" type="slidenum">
+            <a:fld id="{ED7E845F-BD77-40AE-99E2-6ED96B6AB567}" type="slidenum">
               <a:rPr b="0" lang="de-DE" sz="980" spc="-1" strike="noStrike">
                 <a:solidFill>
                   <a:srgbClr val="515151"/>
@@ -7978,7 +7982,7 @@
         <p:spPr>
           <a:xfrm>
             <a:off x="144000" y="1268640"/>
-            <a:ext cx="8747640" cy="4853880"/>
+            <a:ext cx="8746920" cy="4853160"/>
           </a:xfrm>
           <a:prstGeom prst="rect">
             <a:avLst/>
@@ -7997,7 +8001,7 @@
         <p:txBody>
           <a:bodyPr lIns="90000" rIns="90000" tIns="45000" bIns="45000"/>
           <a:p>
-            <a:pPr marL="257040" indent="-255960">
+            <a:pPr marL="257040" indent="-255240">
               <a:lnSpc>
                 <a:spcPct val="100000"/>
               </a:lnSpc>
@@ -8023,7 +8027,7 @@
             </a:endParaRPr>
           </a:p>
           <a:p>
-            <a:pPr lvl="1" marL="864000" indent="-323280">
+            <a:pPr lvl="1" marL="864000" indent="-322560">
               <a:lnSpc>
                 <a:spcPct val="100000"/>
               </a:lnSpc>
@@ -8054,7 +8058,7 @@
             </a:endParaRPr>
           </a:p>
           <a:p>
-            <a:pPr marL="257040" indent="-255960">
+            <a:pPr marL="257040" indent="-255240">
               <a:lnSpc>
                 <a:spcPct val="100000"/>
               </a:lnSpc>
@@ -8080,7 +8084,7 @@
             </a:endParaRPr>
           </a:p>
           <a:p>
-            <a:pPr lvl="1" marL="864000" indent="-323280">
+            <a:pPr lvl="1" marL="864000" indent="-322560">
               <a:lnSpc>
                 <a:spcPct val="100000"/>
               </a:lnSpc>
@@ -8141,7 +8145,7 @@
             </a:endParaRPr>
           </a:p>
           <a:p>
-            <a:pPr lvl="1" marL="864000" indent="-323280">
+            <a:pPr lvl="1" marL="864000" indent="-322560">
               <a:lnSpc>
                 <a:spcPct val="100000"/>
               </a:lnSpc>
@@ -8202,7 +8206,7 @@
             </a:endParaRPr>
           </a:p>
           <a:p>
-            <a:pPr marL="257040" indent="-255960">
+            <a:pPr marL="257040" indent="-255240">
               <a:lnSpc>
                 <a:spcPct val="100000"/>
               </a:lnSpc>
@@ -8228,7 +8232,7 @@
             </a:endParaRPr>
           </a:p>
           <a:p>
-            <a:pPr lvl="1" marL="864000" indent="-323280">
+            <a:pPr lvl="1" marL="864000" indent="-322560">
               <a:lnSpc>
                 <a:spcPct val="100000"/>
               </a:lnSpc>
@@ -8282,7 +8286,7 @@
         <p:spPr>
           <a:xfrm>
             <a:off x="251640" y="6381360"/>
-            <a:ext cx="2132640" cy="286920"/>
+            <a:ext cx="2131920" cy="286200"/>
           </a:xfrm>
           <a:prstGeom prst="rect">
             <a:avLst/>
@@ -8306,7 +8310,7 @@
                 <a:spcPct val="100000"/>
               </a:lnSpc>
             </a:pPr>
-            <a:fld id="{3BF477A2-71A8-4D3C-BC40-37CCE38B55D3}" type="datetime1">
+            <a:fld id="{F03A6F1F-F904-4036-A890-D86A972ACC6E}" type="datetime1">
               <a:rPr b="0" lang="de-DE" sz="1400" spc="-1" strike="noStrike">
                 <a:solidFill>
                   <a:srgbClr val="3d3d3d"/>
@@ -8314,7 +8318,7 @@
                 <a:latin typeface="Calibri"/>
                 <a:ea typeface="Source Sans Pro"/>
               </a:rPr>
-              <a:t>02.04.2019</a:t>
+              <a:t>05.04.2019</a:t>
             </a:fld>
             <a:endParaRPr b="0" lang="de-DE" sz="1400" spc="-1" strike="noStrike">
               <a:latin typeface="Arial"/>
@@ -8331,7 +8335,7 @@
         <p:spPr>
           <a:xfrm>
             <a:off x="2910960" y="258840"/>
-            <a:ext cx="5755680" cy="504720"/>
+            <a:ext cx="5754960" cy="504000"/>
           </a:xfrm>
           <a:prstGeom prst="rect">
             <a:avLst/>
@@ -8382,6 +8386,1318 @@
           <p:childTnLst>
             <p:seq>
               <p:cTn id="20" dur="indefinite" nodeType="mainSeq"/>
+              <p:prevCondLst>
+                <p:cond delay="0" evt="onPrev">
+                  <p:tgtEl>
+                    <p:sldTgt/>
+                  </p:tgtEl>
+                </p:cond>
+              </p:prevCondLst>
+              <p:nextCondLst>
+                <p:cond delay="0" evt="onNext">
+                  <p:tgtEl>
+                    <p:sldTgt/>
+                  </p:tgtEl>
+                </p:cond>
+              </p:nextCondLst>
+            </p:seq>
+          </p:childTnLst>
+        </p:cTn>
+      </p:par>
+    </p:tnLst>
+  </p:timing>
+</p:sld>
+</file>
+
+<file path=ppt/slides/slide11.xml><?xml version="1.0" encoding="utf-8"?>
+<p:sld xmlns:a="http://schemas.openxmlformats.org/drawingml/2006/main" xmlns:p="http://schemas.openxmlformats.org/presentationml/2006/main" xmlns:r="http://schemas.openxmlformats.org/officeDocument/2006/relationships" xmlns:p14="http://schemas.microsoft.com/office/powerpoint/2010/main" xmlns:p15="http://schemas.microsoft.com/office/powerpoint/2012/main" xmlns:mc="http://schemas.openxmlformats.org/markup-compatibility/2006">
+  <p:cSld>
+    <p:spTree>
+      <p:nvGrpSpPr>
+        <p:cNvPr id="1" name=""/>
+        <p:cNvGrpSpPr/>
+        <p:nvPr/>
+      </p:nvGrpSpPr>
+      <p:grpSpPr>
+        <a:xfrm>
+          <a:off x="0" y="0"/>
+          <a:ext cx="0" cy="0"/>
+          <a:chOff x="0" y="0"/>
+          <a:chExt cx="0" cy="0"/>
+        </a:xfrm>
+      </p:grpSpPr>
+      <p:sp>
+        <p:nvSpPr>
+          <p:cNvPr id="249" name="CustomShape 1"/>
+          <p:cNvSpPr/>
+          <p:nvPr/>
+        </p:nvSpPr>
+        <p:spPr>
+          <a:xfrm>
+            <a:off x="6553080" y="6381360"/>
+            <a:ext cx="2337480" cy="286200"/>
+          </a:xfrm>
+          <a:prstGeom prst="rect">
+            <a:avLst/>
+          </a:prstGeom>
+          <a:noFill/>
+          <a:ln>
+            <a:noFill/>
+          </a:ln>
+        </p:spPr>
+        <p:style>
+          <a:lnRef idx="0"/>
+          <a:fillRef idx="0"/>
+          <a:effectRef idx="0"/>
+          <a:fontRef idx="minor"/>
+        </p:style>
+        <p:txBody>
+          <a:bodyPr lIns="90000" rIns="90000" tIns="45000" bIns="45000"/>
+          <a:p>
+            <a:pPr algn="r">
+              <a:lnSpc>
+                <a:spcPct val="100000"/>
+              </a:lnSpc>
+            </a:pPr>
+            <a:fld id="{572AA190-1588-4361-9DD3-5A343EFBEAAC}" type="slidenum">
+              <a:rPr b="0" lang="de-DE" sz="980" spc="-1" strike="noStrike">
+                <a:solidFill>
+                  <a:srgbClr val="515151"/>
+                </a:solidFill>
+                <a:latin typeface="Source Sans Pro"/>
+                <a:ea typeface="Source Sans Pro"/>
+              </a:rPr>
+              <a:t>&lt;number&gt;</a:t>
+            </a:fld>
+            <a:endParaRPr b="0" lang="de-DE" sz="980" spc="-1" strike="noStrike">
+              <a:latin typeface="Arial"/>
+            </a:endParaRPr>
+          </a:p>
+        </p:txBody>
+      </p:sp>
+      <p:sp>
+        <p:nvSpPr>
+          <p:cNvPr id="250" name="CustomShape 2"/>
+          <p:cNvSpPr/>
+          <p:nvPr/>
+        </p:nvSpPr>
+        <p:spPr>
+          <a:xfrm>
+            <a:off x="216000" y="1512000"/>
+            <a:ext cx="8854560" cy="4853160"/>
+          </a:xfrm>
+          <a:prstGeom prst="rect">
+            <a:avLst/>
+          </a:prstGeom>
+          <a:noFill/>
+          <a:ln>
+            <a:noFill/>
+          </a:ln>
+        </p:spPr>
+        <p:style>
+          <a:lnRef idx="0"/>
+          <a:fillRef idx="0"/>
+          <a:effectRef idx="0"/>
+          <a:fontRef idx="minor"/>
+        </p:style>
+        <p:txBody>
+          <a:bodyPr lIns="90000" rIns="90000" tIns="45000" bIns="45000"/>
+          <a:p>
+            <a:pPr marL="257040" indent="-255240">
+              <a:lnSpc>
+                <a:spcPct val="100000"/>
+              </a:lnSpc>
+              <a:spcBef>
+                <a:spcPts val="561"/>
+              </a:spcBef>
+              <a:buBlip>
+                <a:blip r:embed="rId1"/>
+              </a:buBlip>
+            </a:pPr>
+            <a:r>
+              <a:rPr b="0" lang="de-DE" sz="2800" spc="-1" strike="noStrike">
+                <a:solidFill>
+                  <a:srgbClr val="3d3d3d"/>
+                </a:solidFill>
+                <a:latin typeface="Calibri"/>
+                <a:ea typeface="Source Sans Pro"/>
+              </a:rPr>
+              <a:t>Share your results with your team or with researchers from a broader community</a:t>
+            </a:r>
+            <a:endParaRPr b="0" lang="de-DE" sz="2800" spc="-1" strike="noStrike">
+              <a:latin typeface="Arial"/>
+            </a:endParaRPr>
+          </a:p>
+          <a:p>
+            <a:pPr lvl="2" marL="648000" indent="-215280">
+              <a:lnSpc>
+                <a:spcPct val="100000"/>
+              </a:lnSpc>
+              <a:spcBef>
+                <a:spcPts val="561"/>
+              </a:spcBef>
+              <a:buClr>
+                <a:srgbClr val="000000"/>
+              </a:buClr>
+              <a:buSzPct val="45000"/>
+              <a:buFont typeface="Wingdings" charset="2"/>
+              <a:buChar char=""/>
+            </a:pPr>
+            <a:r>
+              <a:rPr b="0" lang="de-DE" sz="1800" spc="-1" strike="noStrike">
+                <a:solidFill>
+                  <a:srgbClr val="000000"/>
+                </a:solidFill>
+                <a:latin typeface="Calibri"/>
+                <a:ea typeface="Calibri"/>
+              </a:rPr>
+              <a:t>Post-processing Datasets</a:t>
+            </a:r>
+            <a:endParaRPr b="0" lang="de-DE" sz="1800" spc="-1" strike="noStrike">
+              <a:latin typeface="Arial"/>
+            </a:endParaRPr>
+          </a:p>
+          <a:p>
+            <a:pPr lvl="2" marL="648000" indent="-215280">
+              <a:lnSpc>
+                <a:spcPct val="100000"/>
+              </a:lnSpc>
+              <a:spcBef>
+                <a:spcPts val="561"/>
+              </a:spcBef>
+              <a:buClr>
+                <a:srgbClr val="000000"/>
+              </a:buClr>
+              <a:buSzPct val="45000"/>
+              <a:buFont typeface="Wingdings" charset="2"/>
+              <a:buChar char=""/>
+            </a:pPr>
+            <a:r>
+              <a:rPr b="0" lang="de-DE" sz="1800" spc="-1" strike="noStrike">
+                <a:solidFill>
+                  <a:srgbClr val="000000"/>
+                </a:solidFill>
+                <a:latin typeface="Calibri"/>
+                <a:ea typeface="Calibri"/>
+              </a:rPr>
+              <a:t>Notebooks</a:t>
+            </a:r>
+            <a:endParaRPr b="0" lang="de-DE" sz="1800" spc="-1" strike="noStrike">
+              <a:latin typeface="Arial"/>
+            </a:endParaRPr>
+          </a:p>
+          <a:p>
+            <a:pPr marL="257040" indent="-255240">
+              <a:lnSpc>
+                <a:spcPct val="100000"/>
+              </a:lnSpc>
+              <a:spcBef>
+                <a:spcPts val="561"/>
+              </a:spcBef>
+              <a:buBlip>
+                <a:blip r:embed="rId2"/>
+              </a:buBlip>
+            </a:pPr>
+            <a:r>
+              <a:rPr b="0" lang="de-DE" sz="2600" spc="-1" strike="noStrike">
+                <a:solidFill>
+                  <a:srgbClr val="3d3d3d"/>
+                </a:solidFill>
+                <a:latin typeface="Calibri"/>
+                <a:ea typeface="Source Sans Pro"/>
+              </a:rPr>
+              <a:t>Cloud-based storage services integrated within ECAS</a:t>
+            </a:r>
+            <a:endParaRPr b="0" lang="de-DE" sz="2600" spc="-1" strike="noStrike">
+              <a:latin typeface="Arial"/>
+            </a:endParaRPr>
+          </a:p>
+          <a:p>
+            <a:pPr lvl="1" marL="864000" indent="-322560">
+              <a:lnSpc>
+                <a:spcPct val="100000"/>
+              </a:lnSpc>
+              <a:spcBef>
+                <a:spcPts val="561"/>
+              </a:spcBef>
+              <a:buClr>
+                <a:srgbClr val="000000"/>
+              </a:buClr>
+              <a:buSzPct val="75000"/>
+              <a:buFont typeface="Symbol"/>
+              <a:buChar char=""/>
+            </a:pPr>
+            <a:r>
+              <a:rPr b="1" lang="de-DE" sz="1800" spc="-1" strike="noStrike">
+                <a:solidFill>
+                  <a:srgbClr val="000000"/>
+                </a:solidFill>
+                <a:latin typeface="Calibri"/>
+                <a:ea typeface="Calibri"/>
+              </a:rPr>
+              <a:t>B2DROP</a:t>
+            </a:r>
+            <a:r>
+              <a:rPr b="0" lang="de-DE" sz="1800" spc="-1" strike="noStrike">
+                <a:solidFill>
+                  <a:srgbClr val="000000"/>
+                </a:solidFill>
+                <a:latin typeface="Calibri"/>
+                <a:ea typeface="Calibri"/>
+              </a:rPr>
+              <a:t> online storage for external colloborators as well as for collaborators who uses B2DROP too. Keep data synchronized and up-to-date. </a:t>
+            </a:r>
+            <a:endParaRPr b="0" lang="de-DE" sz="1800" spc="-1" strike="noStrike">
+              <a:latin typeface="Arial"/>
+            </a:endParaRPr>
+          </a:p>
+          <a:p>
+            <a:pPr lvl="1" marL="864000" indent="-322560">
+              <a:lnSpc>
+                <a:spcPct val="100000"/>
+              </a:lnSpc>
+              <a:spcBef>
+                <a:spcPts val="561"/>
+              </a:spcBef>
+              <a:buClr>
+                <a:srgbClr val="000000"/>
+              </a:buClr>
+              <a:buSzPct val="75000"/>
+              <a:buFont typeface="Symbol"/>
+              <a:buChar char=""/>
+            </a:pPr>
+            <a:r>
+              <a:rPr b="1" lang="de-DE" sz="1800" spc="-1" strike="noStrike">
+                <a:solidFill>
+                  <a:srgbClr val="000000"/>
+                </a:solidFill>
+                <a:latin typeface="Calibri"/>
+                <a:ea typeface="Calibri"/>
+              </a:rPr>
+              <a:t>B2SHARE</a:t>
+            </a:r>
+            <a:r>
+              <a:rPr b="0" lang="de-DE" sz="1800" spc="-1" strike="noStrike">
+                <a:solidFill>
+                  <a:srgbClr val="000000"/>
+                </a:solidFill>
+                <a:latin typeface="Calibri"/>
+                <a:ea typeface="Calibri"/>
+              </a:rPr>
+              <a:t> store and publish research data from diverse contexts. Data assigned a </a:t>
+            </a:r>
+            <a:r>
+              <a:rPr b="1" lang="de-DE" sz="1800" spc="-1" strike="noStrike">
+                <a:solidFill>
+                  <a:srgbClr val="000000"/>
+                </a:solidFill>
+                <a:latin typeface="Calibri"/>
+                <a:ea typeface="Calibri"/>
+              </a:rPr>
+              <a:t>Persistent Identifier</a:t>
+            </a:r>
+            <a:r>
+              <a:rPr b="0" lang="de-DE" sz="1800" spc="-1" strike="noStrike">
+                <a:solidFill>
+                  <a:srgbClr val="000000"/>
+                </a:solidFill>
+                <a:latin typeface="Calibri"/>
+                <a:ea typeface="Calibri"/>
+              </a:rPr>
+              <a:t> for better findability.</a:t>
+            </a:r>
+            <a:endParaRPr b="0" lang="de-DE" sz="1800" spc="-1" strike="noStrike">
+              <a:latin typeface="Arial"/>
+            </a:endParaRPr>
+          </a:p>
+          <a:p>
+            <a:pPr lvl="1" marL="864000" indent="-322560">
+              <a:lnSpc>
+                <a:spcPct val="100000"/>
+              </a:lnSpc>
+              <a:spcBef>
+                <a:spcPts val="1199"/>
+              </a:spcBef>
+              <a:buClr>
+                <a:srgbClr val="000000"/>
+              </a:buClr>
+              <a:buSzPct val="75000"/>
+              <a:buFont typeface="Symbol"/>
+              <a:buChar char=""/>
+            </a:pPr>
+            <a:r>
+              <a:rPr b="1" lang="de-DE" sz="1800" spc="-1" strike="noStrike">
+                <a:solidFill>
+                  <a:srgbClr val="000000"/>
+                </a:solidFill>
+                <a:latin typeface="Calibri"/>
+                <a:ea typeface="Calibri"/>
+              </a:rPr>
+              <a:t>DataHub (OneData) </a:t>
+            </a:r>
+            <a:r>
+              <a:rPr b="0" lang="de-DE" sz="1800" spc="-1" strike="noStrike">
+                <a:solidFill>
+                  <a:srgbClr val="000000"/>
+                </a:solidFill>
+                <a:latin typeface="Calibri"/>
+                <a:ea typeface="Calibri"/>
+              </a:rPr>
+              <a:t>a global data access solution for eScience.   </a:t>
+            </a:r>
+            <a:endParaRPr b="0" lang="de-DE" sz="1800" spc="-1" strike="noStrike">
+              <a:latin typeface="Arial"/>
+            </a:endParaRPr>
+          </a:p>
+          <a:p>
+            <a:pPr>
+              <a:lnSpc>
+                <a:spcPct val="100000"/>
+              </a:lnSpc>
+              <a:spcBef>
+                <a:spcPts val="1001"/>
+              </a:spcBef>
+            </a:pPr>
+            <a:endParaRPr b="0" lang="de-DE" sz="1800" spc="-1" strike="noStrike">
+              <a:latin typeface="Arial"/>
+            </a:endParaRPr>
+          </a:p>
+        </p:txBody>
+      </p:sp>
+      <p:sp>
+        <p:nvSpPr>
+          <p:cNvPr id="251" name="CustomShape 3"/>
+          <p:cNvSpPr/>
+          <p:nvPr/>
+        </p:nvSpPr>
+        <p:spPr>
+          <a:xfrm>
+            <a:off x="251640" y="6381360"/>
+            <a:ext cx="2131920" cy="286200"/>
+          </a:xfrm>
+          <a:prstGeom prst="rect">
+            <a:avLst/>
+          </a:prstGeom>
+          <a:noFill/>
+          <a:ln>
+            <a:noFill/>
+          </a:ln>
+        </p:spPr>
+        <p:style>
+          <a:lnRef idx="0"/>
+          <a:fillRef idx="0"/>
+          <a:effectRef idx="0"/>
+          <a:fontRef idx="minor"/>
+        </p:style>
+        <p:txBody>
+          <a:bodyPr lIns="90000" rIns="90000" tIns="45000" bIns="45000"/>
+          <a:p>
+            <a:pPr>
+              <a:lnSpc>
+                <a:spcPct val="100000"/>
+              </a:lnSpc>
+            </a:pPr>
+            <a:fld id="{E68A937E-BC65-4EF7-8E3C-CA3D7FF83475}" type="datetime1">
+              <a:rPr b="0" lang="de-DE" sz="1400" spc="-1" strike="noStrike">
+                <a:solidFill>
+                  <a:srgbClr val="3d3d3d"/>
+                </a:solidFill>
+                <a:latin typeface="Calibri"/>
+                <a:ea typeface="Source Sans Pro"/>
+              </a:rPr>
+              <a:t>05.04.2019</a:t>
+            </a:fld>
+            <a:endParaRPr b="0" lang="de-DE" sz="1400" spc="-1" strike="noStrike">
+              <a:latin typeface="Arial"/>
+            </a:endParaRPr>
+          </a:p>
+        </p:txBody>
+      </p:sp>
+      <p:sp>
+        <p:nvSpPr>
+          <p:cNvPr id="252" name="CustomShape 4"/>
+          <p:cNvSpPr/>
+          <p:nvPr/>
+        </p:nvSpPr>
+        <p:spPr>
+          <a:xfrm>
+            <a:off x="2910960" y="258840"/>
+            <a:ext cx="5754960" cy="504000"/>
+          </a:xfrm>
+          <a:prstGeom prst="rect">
+            <a:avLst/>
+          </a:prstGeom>
+          <a:noFill/>
+          <a:ln>
+            <a:noFill/>
+          </a:ln>
+        </p:spPr>
+        <p:style>
+          <a:lnRef idx="0"/>
+          <a:fillRef idx="0"/>
+          <a:effectRef idx="0"/>
+          <a:fontRef idx="minor"/>
+        </p:style>
+        <p:txBody>
+          <a:bodyPr lIns="90000" rIns="90000" tIns="45000" bIns="45000">
+            <a:normAutofit/>
+          </a:bodyPr>
+          <a:p>
+            <a:pPr>
+              <a:lnSpc>
+                <a:spcPct val="100000"/>
+              </a:lnSpc>
+            </a:pPr>
+            <a:r>
+              <a:rPr b="1" lang="de-DE" sz="3600" spc="-1" strike="noStrike">
+                <a:solidFill>
+                  <a:srgbClr val="1d2f45"/>
+                </a:solidFill>
+                <a:latin typeface="Calibri"/>
+                <a:ea typeface="Source Sans Pro"/>
+              </a:rPr>
+              <a:t>      </a:t>
+            </a:r>
+            <a:r>
+              <a:rPr b="1" lang="de-DE" sz="3600" spc="-1" strike="noStrike">
+                <a:solidFill>
+                  <a:srgbClr val="1d2f45"/>
+                </a:solidFill>
+                <a:latin typeface="Calibri"/>
+                <a:ea typeface="Source Sans Pro"/>
+              </a:rPr>
+              <a:t>Data sharing with ECAS</a:t>
+            </a:r>
+            <a:endParaRPr b="0" lang="de-DE" sz="3600" spc="-1" strike="noStrike">
+              <a:latin typeface="Arial"/>
+            </a:endParaRPr>
+          </a:p>
+        </p:txBody>
+      </p:sp>
+      <p:pic>
+        <p:nvPicPr>
+          <p:cNvPr id="253" name="" descr=""/>
+          <p:cNvPicPr/>
+          <p:nvPr/>
+        </p:nvPicPr>
+        <p:blipFill>
+          <a:blip r:embed="rId3"/>
+          <a:stretch/>
+        </p:blipFill>
+        <p:spPr>
+          <a:xfrm rot="21569400">
+            <a:off x="2018520" y="5474520"/>
+            <a:ext cx="761040" cy="784440"/>
+          </a:xfrm>
+          <a:prstGeom prst="rect">
+            <a:avLst/>
+          </a:prstGeom>
+          <a:ln>
+            <a:noFill/>
+          </a:ln>
+        </p:spPr>
+      </p:pic>
+      <p:pic>
+        <p:nvPicPr>
+          <p:cNvPr id="254" name="" descr=""/>
+          <p:cNvPicPr/>
+          <p:nvPr/>
+        </p:nvPicPr>
+        <p:blipFill>
+          <a:blip r:embed="rId4"/>
+          <a:stretch/>
+        </p:blipFill>
+        <p:spPr>
+          <a:xfrm>
+            <a:off x="3060000" y="5472000"/>
+            <a:ext cx="719280" cy="827280"/>
+          </a:xfrm>
+          <a:prstGeom prst="rect">
+            <a:avLst/>
+          </a:prstGeom>
+          <a:ln>
+            <a:noFill/>
+          </a:ln>
+        </p:spPr>
+      </p:pic>
+      <p:pic>
+        <p:nvPicPr>
+          <p:cNvPr id="255" name="" descr=""/>
+          <p:cNvPicPr/>
+          <p:nvPr/>
+        </p:nvPicPr>
+        <p:blipFill>
+          <a:blip r:embed="rId5"/>
+          <a:stretch/>
+        </p:blipFill>
+        <p:spPr>
+          <a:xfrm>
+            <a:off x="3996000" y="5658120"/>
+            <a:ext cx="2854800" cy="497160"/>
+          </a:xfrm>
+          <a:prstGeom prst="rect">
+            <a:avLst/>
+          </a:prstGeom>
+          <a:ln>
+            <a:noFill/>
+          </a:ln>
+        </p:spPr>
+      </p:pic>
+    </p:spTree>
+  </p:cSld>
+  <p:timing>
+    <p:tnLst>
+      <p:par>
+        <p:cTn id="21" dur="indefinite" restart="never" nodeType="tmRoot">
+          <p:childTnLst>
+            <p:seq>
+              <p:cTn id="22" dur="indefinite" nodeType="mainSeq"/>
+              <p:prevCondLst>
+                <p:cond delay="0" evt="onPrev">
+                  <p:tgtEl>
+                    <p:sldTgt/>
+                  </p:tgtEl>
+                </p:cond>
+              </p:prevCondLst>
+              <p:nextCondLst>
+                <p:cond delay="0" evt="onNext">
+                  <p:tgtEl>
+                    <p:sldTgt/>
+                  </p:tgtEl>
+                </p:cond>
+              </p:nextCondLst>
+            </p:seq>
+          </p:childTnLst>
+        </p:cTn>
+      </p:par>
+    </p:tnLst>
+  </p:timing>
+</p:sld>
+</file>
+
+<file path=ppt/slides/slide12.xml><?xml version="1.0" encoding="utf-8"?>
+<p:sld xmlns:a="http://schemas.openxmlformats.org/drawingml/2006/main" xmlns:p="http://schemas.openxmlformats.org/presentationml/2006/main" xmlns:r="http://schemas.openxmlformats.org/officeDocument/2006/relationships" xmlns:p14="http://schemas.microsoft.com/office/powerpoint/2010/main" xmlns:p15="http://schemas.microsoft.com/office/powerpoint/2012/main" xmlns:mc="http://schemas.openxmlformats.org/markup-compatibility/2006">
+  <p:cSld>
+    <p:spTree>
+      <p:nvGrpSpPr>
+        <p:cNvPr id="1" name=""/>
+        <p:cNvGrpSpPr/>
+        <p:nvPr/>
+      </p:nvGrpSpPr>
+      <p:grpSpPr>
+        <a:xfrm>
+          <a:off x="0" y="0"/>
+          <a:ext cx="0" cy="0"/>
+          <a:chOff x="0" y="0"/>
+          <a:chExt cx="0" cy="0"/>
+        </a:xfrm>
+      </p:grpSpPr>
+      <p:sp>
+        <p:nvSpPr>
+          <p:cNvPr id="256" name="CustomShape 1"/>
+          <p:cNvSpPr/>
+          <p:nvPr/>
+        </p:nvSpPr>
+        <p:spPr>
+          <a:xfrm>
+            <a:off x="6553080" y="6381360"/>
+            <a:ext cx="2337480" cy="286200"/>
+          </a:xfrm>
+          <a:prstGeom prst="rect">
+            <a:avLst/>
+          </a:prstGeom>
+          <a:noFill/>
+          <a:ln>
+            <a:noFill/>
+          </a:ln>
+        </p:spPr>
+        <p:style>
+          <a:lnRef idx="0"/>
+          <a:fillRef idx="0"/>
+          <a:effectRef idx="0"/>
+          <a:fontRef idx="minor"/>
+        </p:style>
+        <p:txBody>
+          <a:bodyPr lIns="90000" rIns="90000" tIns="45000" bIns="45000"/>
+          <a:p>
+            <a:pPr algn="r">
+              <a:lnSpc>
+                <a:spcPct val="100000"/>
+              </a:lnSpc>
+            </a:pPr>
+            <a:fld id="{B52A577A-B524-4168-9A6E-EC4A2FDEAEF6}" type="slidenum">
+              <a:rPr b="0" lang="de-DE" sz="980" spc="-1" strike="noStrike">
+                <a:solidFill>
+                  <a:srgbClr val="515151"/>
+                </a:solidFill>
+                <a:latin typeface="Source Sans Pro"/>
+                <a:ea typeface="Source Sans Pro"/>
+              </a:rPr>
+              <a:t>&lt;number&gt;</a:t>
+            </a:fld>
+            <a:endParaRPr b="0" lang="de-DE" sz="980" spc="-1" strike="noStrike">
+              <a:latin typeface="Arial"/>
+            </a:endParaRPr>
+          </a:p>
+        </p:txBody>
+      </p:sp>
+      <p:sp>
+        <p:nvSpPr>
+          <p:cNvPr id="257" name="CustomShape 2"/>
+          <p:cNvSpPr/>
+          <p:nvPr/>
+        </p:nvSpPr>
+        <p:spPr>
+          <a:xfrm>
+            <a:off x="251640" y="6381360"/>
+            <a:ext cx="2131920" cy="286200"/>
+          </a:xfrm>
+          <a:prstGeom prst="rect">
+            <a:avLst/>
+          </a:prstGeom>
+          <a:noFill/>
+          <a:ln>
+            <a:noFill/>
+          </a:ln>
+        </p:spPr>
+        <p:style>
+          <a:lnRef idx="0"/>
+          <a:fillRef idx="0"/>
+          <a:effectRef idx="0"/>
+          <a:fontRef idx="minor"/>
+        </p:style>
+        <p:txBody>
+          <a:bodyPr lIns="90000" rIns="90000" tIns="45000" bIns="45000"/>
+          <a:p>
+            <a:pPr>
+              <a:lnSpc>
+                <a:spcPct val="100000"/>
+              </a:lnSpc>
+            </a:pPr>
+            <a:fld id="{B484540B-3457-44B9-AB50-36A144344471}" type="datetime1">
+              <a:rPr b="0" lang="de-DE" sz="1400" spc="-1" strike="noStrike">
+                <a:solidFill>
+                  <a:srgbClr val="3d3d3d"/>
+                </a:solidFill>
+                <a:latin typeface="Calibri"/>
+                <a:ea typeface="Source Sans Pro"/>
+              </a:rPr>
+              <a:t>05.04.2019</a:t>
+            </a:fld>
+            <a:endParaRPr b="0" lang="de-DE" sz="1400" spc="-1" strike="noStrike">
+              <a:latin typeface="Arial"/>
+            </a:endParaRPr>
+          </a:p>
+        </p:txBody>
+      </p:sp>
+      <p:sp>
+        <p:nvSpPr>
+          <p:cNvPr id="258" name="CustomShape 3"/>
+          <p:cNvSpPr/>
+          <p:nvPr/>
+        </p:nvSpPr>
+        <p:spPr>
+          <a:xfrm>
+            <a:off x="2910960" y="258840"/>
+            <a:ext cx="5754960" cy="504000"/>
+          </a:xfrm>
+          <a:prstGeom prst="rect">
+            <a:avLst/>
+          </a:prstGeom>
+          <a:noFill/>
+          <a:ln>
+            <a:noFill/>
+          </a:ln>
+        </p:spPr>
+        <p:style>
+          <a:lnRef idx="0"/>
+          <a:fillRef idx="0"/>
+          <a:effectRef idx="0"/>
+          <a:fontRef idx="minor"/>
+        </p:style>
+        <p:txBody>
+          <a:bodyPr lIns="90000" rIns="90000" tIns="45000" bIns="45000">
+            <a:normAutofit/>
+          </a:bodyPr>
+          <a:p>
+            <a:pPr>
+              <a:lnSpc>
+                <a:spcPct val="100000"/>
+              </a:lnSpc>
+            </a:pPr>
+            <a:r>
+              <a:rPr b="1" lang="de-DE" sz="3600" spc="-1" strike="noStrike">
+                <a:solidFill>
+                  <a:srgbClr val="1d2f45"/>
+                </a:solidFill>
+                <a:latin typeface="Calibri"/>
+                <a:ea typeface="Source Sans Pro"/>
+              </a:rPr>
+              <a:t>      </a:t>
+            </a:r>
+            <a:r>
+              <a:rPr b="1" lang="de-DE" sz="3600" spc="-1" strike="noStrike">
+                <a:solidFill>
+                  <a:srgbClr val="1d2f45"/>
+                </a:solidFill>
+                <a:latin typeface="Calibri"/>
+                <a:ea typeface="Source Sans Pro"/>
+              </a:rPr>
+              <a:t>B2DROP shared</a:t>
+            </a:r>
+            <a:endParaRPr b="0" lang="de-DE" sz="3600" spc="-1" strike="noStrike">
+              <a:latin typeface="Arial"/>
+            </a:endParaRPr>
+          </a:p>
+        </p:txBody>
+      </p:sp>
+      <p:pic>
+        <p:nvPicPr>
+          <p:cNvPr id="259" name="" descr=""/>
+          <p:cNvPicPr/>
+          <p:nvPr/>
+        </p:nvPicPr>
+        <p:blipFill>
+          <a:blip r:embed="rId1"/>
+          <a:stretch/>
+        </p:blipFill>
+        <p:spPr>
+          <a:xfrm rot="21569400">
+            <a:off x="6366240" y="182520"/>
+            <a:ext cx="761040" cy="784440"/>
+          </a:xfrm>
+          <a:prstGeom prst="rect">
+            <a:avLst/>
+          </a:prstGeom>
+          <a:ln>
+            <a:noFill/>
+          </a:ln>
+        </p:spPr>
+      </p:pic>
+      <p:pic>
+        <p:nvPicPr>
+          <p:cNvPr id="260" name="" descr=""/>
+          <p:cNvPicPr/>
+          <p:nvPr/>
+        </p:nvPicPr>
+        <p:blipFill>
+          <a:blip r:embed="rId2"/>
+          <a:stretch/>
+        </p:blipFill>
+        <p:spPr>
+          <a:xfrm>
+            <a:off x="14400" y="1818720"/>
+            <a:ext cx="9142920" cy="2802240"/>
+          </a:xfrm>
+          <a:prstGeom prst="rect">
+            <a:avLst/>
+          </a:prstGeom>
+          <a:ln>
+            <a:noFill/>
+          </a:ln>
+        </p:spPr>
+      </p:pic>
+      <p:sp>
+        <p:nvSpPr>
+          <p:cNvPr id="261" name="CustomShape 4"/>
+          <p:cNvSpPr/>
+          <p:nvPr/>
+        </p:nvSpPr>
+        <p:spPr>
+          <a:xfrm>
+            <a:off x="936000" y="3888000"/>
+            <a:ext cx="7199280" cy="2375280"/>
+          </a:xfrm>
+          <a:prstGeom prst="rect">
+            <a:avLst/>
+          </a:prstGeom>
+          <a:blipFill rotWithShape="0">
+            <a:blip r:embed="rId3"/>
+            <a:stretch>
+              <a:fillRect/>
+            </a:stretch>
+          </a:blipFill>
+          <a:ln>
+            <a:noFill/>
+          </a:ln>
+        </p:spPr>
+        <p:style>
+          <a:lnRef idx="0"/>
+          <a:fillRef idx="0"/>
+          <a:effectRef idx="0"/>
+          <a:fontRef idx="minor"/>
+        </p:style>
+        <p:txBody>
+          <a:bodyPr lIns="90000" rIns="90000" tIns="45000" bIns="45000" anchor="ctr"/>
+          <a:p>
+            <a:pPr algn="ctr">
+              <a:lnSpc>
+                <a:spcPct val="100000"/>
+              </a:lnSpc>
+            </a:pPr>
+            <a:r>
+              <a:rPr b="0" lang="de-DE" sz="1800" spc="-1" strike="noStrike">
+                <a:solidFill>
+                  <a:srgbClr val="000000"/>
+                </a:solidFill>
+                <a:latin typeface="Arial"/>
+                <a:ea typeface="DejaVu Sans"/>
+              </a:rPr>
+              <a:t>                                                             </a:t>
+            </a:r>
+            <a:r>
+              <a:rPr b="0" lang="de-DE" sz="1800" spc="-1" strike="noStrike">
+                <a:solidFill>
+                  <a:srgbClr val="000000"/>
+                </a:solidFill>
+                <a:latin typeface="Arial"/>
+                <a:ea typeface="DejaVu Sans"/>
+              </a:rPr>
+              <a:t>B2DROP Web site</a:t>
+            </a:r>
+            <a:endParaRPr b="0" lang="de-DE" sz="1800" spc="-1" strike="noStrike">
+              <a:latin typeface="Arial"/>
+            </a:endParaRPr>
+          </a:p>
+        </p:txBody>
+      </p:sp>
+      <p:sp>
+        <p:nvSpPr>
+          <p:cNvPr id="262" name="CustomShape 5"/>
+          <p:cNvSpPr/>
+          <p:nvPr/>
+        </p:nvSpPr>
+        <p:spPr>
+          <a:xfrm>
+            <a:off x="4334400" y="1296000"/>
+            <a:ext cx="4448880" cy="2244240"/>
+          </a:xfrm>
+          <a:prstGeom prst="rect">
+            <a:avLst/>
+          </a:prstGeom>
+          <a:blipFill rotWithShape="0">
+            <a:blip r:embed="rId4"/>
+            <a:stretch>
+              <a:fillRect/>
+            </a:stretch>
+          </a:blipFill>
+          <a:ln>
+            <a:noFill/>
+          </a:ln>
+        </p:spPr>
+        <p:style>
+          <a:lnRef idx="0"/>
+          <a:fillRef idx="0"/>
+          <a:effectRef idx="0"/>
+          <a:fontRef idx="minor"/>
+        </p:style>
+        <p:txBody>
+          <a:bodyPr lIns="90000" rIns="90000" tIns="45000" bIns="45000" anchor="ctr"/>
+          <a:p>
+            <a:pPr algn="ctr">
+              <a:lnSpc>
+                <a:spcPct val="100000"/>
+              </a:lnSpc>
+            </a:pPr>
+            <a:r>
+              <a:rPr b="0" lang="de-DE" sz="1800" spc="-1" strike="noStrike">
+                <a:solidFill>
+                  <a:srgbClr val="000000"/>
+                </a:solidFill>
+                <a:latin typeface="Arial"/>
+                <a:ea typeface="DejaVu Sans"/>
+              </a:rPr>
+              <a:t>Jupyter extension</a:t>
+            </a:r>
+            <a:endParaRPr b="0" lang="de-DE" sz="1800" spc="-1" strike="noStrike">
+              <a:latin typeface="Arial"/>
+            </a:endParaRPr>
+          </a:p>
+        </p:txBody>
+      </p:sp>
+      <p:sp>
+        <p:nvSpPr>
+          <p:cNvPr id="263" name="CustomShape 6"/>
+          <p:cNvSpPr/>
+          <p:nvPr/>
+        </p:nvSpPr>
+        <p:spPr>
+          <a:xfrm>
+            <a:off x="2376000" y="877320"/>
+            <a:ext cx="4567680" cy="345960"/>
+          </a:xfrm>
+          <a:prstGeom prst="rect">
+            <a:avLst/>
+          </a:prstGeom>
+          <a:noFill/>
+          <a:ln>
+            <a:noFill/>
+          </a:ln>
+        </p:spPr>
+        <p:style>
+          <a:lnRef idx="0"/>
+          <a:fillRef idx="0"/>
+          <a:effectRef idx="0"/>
+          <a:fontRef idx="minor"/>
+        </p:style>
+        <p:txBody>
+          <a:bodyPr lIns="90000" rIns="90000" tIns="45000" bIns="45000"/>
+          <a:p>
+            <a:pPr>
+              <a:lnSpc>
+                <a:spcPct val="100000"/>
+              </a:lnSpc>
+            </a:pPr>
+            <a:r>
+              <a:rPr b="0" lang="de-DE" sz="1800" spc="-1" strike="noStrike">
+                <a:solidFill>
+                  <a:srgbClr val="000000"/>
+                </a:solidFill>
+                <a:latin typeface="Arial"/>
+                <a:ea typeface="DejaVu Sans"/>
+              </a:rPr>
+              <a:t>https://b2drop.eudat.eu/s/gDyJjMeJ2Xiapwi</a:t>
+            </a:r>
+            <a:endParaRPr b="0" lang="de-DE" sz="1800" spc="-1" strike="noStrike">
+              <a:latin typeface="Arial"/>
+            </a:endParaRPr>
+          </a:p>
+        </p:txBody>
+      </p:sp>
+    </p:spTree>
+  </p:cSld>
+  <p:timing>
+    <p:tnLst>
+      <p:par>
+        <p:cTn id="23" dur="indefinite" restart="never" nodeType="tmRoot">
+          <p:childTnLst>
+            <p:seq>
+              <p:cTn id="24" dur="indefinite" nodeType="mainSeq"/>
+              <p:prevCondLst>
+                <p:cond delay="0" evt="onPrev">
+                  <p:tgtEl>
+                    <p:sldTgt/>
+                  </p:tgtEl>
+                </p:cond>
+              </p:prevCondLst>
+              <p:nextCondLst>
+                <p:cond delay="0" evt="onNext">
+                  <p:tgtEl>
+                    <p:sldTgt/>
+                  </p:tgtEl>
+                </p:cond>
+              </p:nextCondLst>
+            </p:seq>
+          </p:childTnLst>
+        </p:cTn>
+      </p:par>
+    </p:tnLst>
+  </p:timing>
+</p:sld>
+</file>
+
+<file path=ppt/slides/slide13.xml><?xml version="1.0" encoding="utf-8"?>
+<p:sld xmlns:a="http://schemas.openxmlformats.org/drawingml/2006/main" xmlns:p="http://schemas.openxmlformats.org/presentationml/2006/main" xmlns:r="http://schemas.openxmlformats.org/officeDocument/2006/relationships" xmlns:p14="http://schemas.microsoft.com/office/powerpoint/2010/main" xmlns:p15="http://schemas.microsoft.com/office/powerpoint/2012/main" xmlns:mc="http://schemas.openxmlformats.org/markup-compatibility/2006">
+  <p:cSld>
+    <p:spTree>
+      <p:nvGrpSpPr>
+        <p:cNvPr id="1" name=""/>
+        <p:cNvGrpSpPr/>
+        <p:nvPr/>
+      </p:nvGrpSpPr>
+      <p:grpSpPr>
+        <a:xfrm>
+          <a:off x="0" y="0"/>
+          <a:ext cx="0" cy="0"/>
+          <a:chOff x="0" y="0"/>
+          <a:chExt cx="0" cy="0"/>
+        </a:xfrm>
+      </p:grpSpPr>
+      <p:sp>
+        <p:nvSpPr>
+          <p:cNvPr id="264" name="CustomShape 1"/>
+          <p:cNvSpPr/>
+          <p:nvPr/>
+        </p:nvSpPr>
+        <p:spPr>
+          <a:xfrm>
+            <a:off x="6553080" y="6381360"/>
+            <a:ext cx="2337480" cy="286200"/>
+          </a:xfrm>
+          <a:prstGeom prst="rect">
+            <a:avLst/>
+          </a:prstGeom>
+          <a:noFill/>
+          <a:ln>
+            <a:noFill/>
+          </a:ln>
+        </p:spPr>
+        <p:style>
+          <a:lnRef idx="0"/>
+          <a:fillRef idx="0"/>
+          <a:effectRef idx="0"/>
+          <a:fontRef idx="minor"/>
+        </p:style>
+        <p:txBody>
+          <a:bodyPr lIns="90000" rIns="90000" tIns="45000" bIns="45000"/>
+          <a:p>
+            <a:pPr algn="r">
+              <a:lnSpc>
+                <a:spcPct val="100000"/>
+              </a:lnSpc>
+            </a:pPr>
+            <a:fld id="{077C1B44-89F9-428C-9498-6F18B210FB98}" type="slidenum">
+              <a:rPr b="0" lang="de-DE" sz="980" spc="-1" strike="noStrike">
+                <a:solidFill>
+                  <a:srgbClr val="515151"/>
+                </a:solidFill>
+                <a:latin typeface="Source Sans Pro"/>
+                <a:ea typeface="Source Sans Pro"/>
+              </a:rPr>
+              <a:t>&lt;number&gt;</a:t>
+            </a:fld>
+            <a:endParaRPr b="0" lang="de-DE" sz="980" spc="-1" strike="noStrike">
+              <a:latin typeface="Arial"/>
+            </a:endParaRPr>
+          </a:p>
+        </p:txBody>
+      </p:sp>
+      <p:sp>
+        <p:nvSpPr>
+          <p:cNvPr id="265" name="CustomShape 2"/>
+          <p:cNvSpPr/>
+          <p:nvPr/>
+        </p:nvSpPr>
+        <p:spPr>
+          <a:xfrm>
+            <a:off x="251640" y="6381360"/>
+            <a:ext cx="2131920" cy="286200"/>
+          </a:xfrm>
+          <a:prstGeom prst="rect">
+            <a:avLst/>
+          </a:prstGeom>
+          <a:noFill/>
+          <a:ln>
+            <a:noFill/>
+          </a:ln>
+        </p:spPr>
+        <p:style>
+          <a:lnRef idx="0"/>
+          <a:fillRef idx="0"/>
+          <a:effectRef idx="0"/>
+          <a:fontRef idx="minor"/>
+        </p:style>
+        <p:txBody>
+          <a:bodyPr lIns="90000" rIns="90000" tIns="45000" bIns="45000"/>
+          <a:p>
+            <a:pPr>
+              <a:lnSpc>
+                <a:spcPct val="100000"/>
+              </a:lnSpc>
+            </a:pPr>
+            <a:fld id="{1FDA0841-D400-40DC-8CB2-E9639E50C45F}" type="datetime1">
+              <a:rPr b="0" lang="de-DE" sz="1400" spc="-1" strike="noStrike">
+                <a:solidFill>
+                  <a:srgbClr val="3d3d3d"/>
+                </a:solidFill>
+                <a:latin typeface="Calibri"/>
+                <a:ea typeface="Source Sans Pro"/>
+              </a:rPr>
+              <a:t>05.04.2019</a:t>
+            </a:fld>
+            <a:endParaRPr b="0" lang="de-DE" sz="1400" spc="-1" strike="noStrike">
+              <a:latin typeface="Arial"/>
+            </a:endParaRPr>
+          </a:p>
+        </p:txBody>
+      </p:sp>
+      <p:sp>
+        <p:nvSpPr>
+          <p:cNvPr id="266" name="CustomShape 3"/>
+          <p:cNvSpPr/>
+          <p:nvPr/>
+        </p:nvSpPr>
+        <p:spPr>
+          <a:xfrm>
+            <a:off x="2910960" y="258840"/>
+            <a:ext cx="5754960" cy="504000"/>
+          </a:xfrm>
+          <a:prstGeom prst="rect">
+            <a:avLst/>
+          </a:prstGeom>
+          <a:noFill/>
+          <a:ln>
+            <a:noFill/>
+          </a:ln>
+        </p:spPr>
+        <p:style>
+          <a:lnRef idx="0"/>
+          <a:fillRef idx="0"/>
+          <a:effectRef idx="0"/>
+          <a:fontRef idx="minor"/>
+        </p:style>
+        <p:txBody>
+          <a:bodyPr lIns="90000" rIns="90000" tIns="45000" bIns="45000">
+            <a:normAutofit/>
+          </a:bodyPr>
+          <a:p>
+            <a:pPr>
+              <a:lnSpc>
+                <a:spcPct val="100000"/>
+              </a:lnSpc>
+            </a:pPr>
+            <a:r>
+              <a:rPr b="1" lang="de-DE" sz="3600" spc="-1" strike="noStrike">
+                <a:solidFill>
+                  <a:srgbClr val="1d2f45"/>
+                </a:solidFill>
+                <a:latin typeface="Calibri"/>
+                <a:ea typeface="Source Sans Pro"/>
+              </a:rPr>
+              <a:t>      </a:t>
+            </a:r>
+            <a:r>
+              <a:rPr b="1" lang="de-DE" sz="3600" spc="-1" strike="noStrike">
+                <a:solidFill>
+                  <a:srgbClr val="1d2f45"/>
+                </a:solidFill>
+                <a:latin typeface="Calibri"/>
+                <a:ea typeface="Source Sans Pro"/>
+              </a:rPr>
+              <a:t>OneData &amp;ECAS</a:t>
+            </a:r>
+            <a:endParaRPr b="0" lang="de-DE" sz="3600" spc="-1" strike="noStrike">
+              <a:latin typeface="Arial"/>
+            </a:endParaRPr>
+          </a:p>
+        </p:txBody>
+      </p:sp>
+      <p:pic>
+        <p:nvPicPr>
+          <p:cNvPr id="267" name="" descr=""/>
+          <p:cNvPicPr/>
+          <p:nvPr/>
+        </p:nvPicPr>
+        <p:blipFill>
+          <a:blip r:embed="rId1"/>
+          <a:stretch/>
+        </p:blipFill>
+        <p:spPr>
+          <a:xfrm>
+            <a:off x="3780000" y="834120"/>
+            <a:ext cx="2447280" cy="389160"/>
+          </a:xfrm>
+          <a:prstGeom prst="rect">
+            <a:avLst/>
+          </a:prstGeom>
+          <a:ln>
+            <a:noFill/>
+          </a:ln>
+        </p:spPr>
+      </p:pic>
+      <p:pic>
+        <p:nvPicPr>
+          <p:cNvPr id="268" name="" descr=""/>
+          <p:cNvPicPr/>
+          <p:nvPr/>
+        </p:nvPicPr>
+        <p:blipFill>
+          <a:blip r:embed="rId2"/>
+          <a:stretch/>
+        </p:blipFill>
+        <p:spPr>
+          <a:xfrm>
+            <a:off x="288000" y="1531800"/>
+            <a:ext cx="8567280" cy="3880080"/>
+          </a:xfrm>
+          <a:prstGeom prst="rect">
+            <a:avLst/>
+          </a:prstGeom>
+          <a:ln>
+            <a:noFill/>
+          </a:ln>
+        </p:spPr>
+      </p:pic>
+      <p:sp>
+        <p:nvSpPr>
+          <p:cNvPr id="269" name="CustomShape 4"/>
+          <p:cNvSpPr/>
+          <p:nvPr/>
+        </p:nvSpPr>
+        <p:spPr>
+          <a:xfrm>
+            <a:off x="2160000" y="5755320"/>
+            <a:ext cx="4365000" cy="345600"/>
+          </a:xfrm>
+          <a:prstGeom prst="rect">
+            <a:avLst/>
+          </a:prstGeom>
+          <a:noFill/>
+          <a:ln>
+            <a:noFill/>
+          </a:ln>
+        </p:spPr>
+        <p:style>
+          <a:lnRef idx="0"/>
+          <a:fillRef idx="0"/>
+          <a:effectRef idx="0"/>
+          <a:fontRef idx="minor"/>
+        </p:style>
+        <p:txBody>
+          <a:bodyPr lIns="90000" rIns="90000" tIns="45000" bIns="45000"/>
+          <a:p>
+            <a:pPr>
+              <a:lnSpc>
+                <a:spcPct val="100000"/>
+              </a:lnSpc>
+            </a:pPr>
+            <a:r>
+              <a:rPr b="0" lang="de-DE" sz="1800" spc="-1" strike="noStrike">
+                <a:solidFill>
+                  <a:srgbClr val="000000"/>
+                </a:solidFill>
+                <a:latin typeface="Arial"/>
+                <a:ea typeface="DejaVu Sans"/>
+              </a:rPr>
+              <a:t>Check the notebook </a:t>
+            </a:r>
+            <a:r>
+              <a:rPr b="0" lang="de-DE" sz="1800" spc="-1" strike="noStrike" u="sng">
+                <a:solidFill>
+                  <a:srgbClr val="0000ff"/>
+                </a:solidFill>
+                <a:uFillTx/>
+                <a:latin typeface="Arial"/>
+                <a:ea typeface="DejaVu Sans"/>
+                <a:hlinkClick r:id="rId3"/>
+              </a:rPr>
+              <a:t>here</a:t>
+            </a:r>
+            <a:r>
+              <a:rPr b="0" lang="de-DE" sz="1800" spc="-1" strike="noStrike">
+                <a:solidFill>
+                  <a:srgbClr val="0000ff"/>
+                </a:solidFill>
+                <a:latin typeface="Arial"/>
+                <a:ea typeface="DejaVu Sans"/>
+              </a:rPr>
+              <a:t> for more details</a:t>
+            </a:r>
+            <a:endParaRPr b="0" lang="de-DE" sz="1800" spc="-1" strike="noStrike">
+              <a:latin typeface="Arial"/>
+            </a:endParaRPr>
+          </a:p>
+        </p:txBody>
+      </p:sp>
+    </p:spTree>
+  </p:cSld>
+  <p:timing>
+    <p:tnLst>
+      <p:par>
+        <p:cTn id="25" dur="indefinite" restart="never" nodeType="tmRoot">
+          <p:childTnLst>
+            <p:seq>
+              <p:cTn id="26" dur="indefinite" nodeType="mainSeq"/>
               <p:prevCondLst>
                 <p:cond delay="0" evt="onPrev">
                   <p:tgtEl>
@@ -8431,7 +9747,7 @@
         <p:spPr>
           <a:xfrm>
             <a:off x="6553080" y="6381360"/>
-            <a:ext cx="2338200" cy="286920"/>
+            <a:ext cx="2337480" cy="286200"/>
           </a:xfrm>
           <a:prstGeom prst="rect">
             <a:avLst/>
@@ -8455,7 +9771,7 @@
                 <a:spcPct val="100000"/>
               </a:lnSpc>
             </a:pPr>
-            <a:fld id="{03FB4BCA-4DB6-4D01-81B4-DBE2CA2B80C0}" type="slidenum">
+            <a:fld id="{C5C68BAD-81D0-4D0E-888D-8A9661DBFECD}" type="slidenum">
               <a:rPr b="0" lang="de-DE" sz="980" spc="-1" strike="noStrike">
                 <a:solidFill>
                   <a:srgbClr val="515151"/>
@@ -8463,7 +9779,7 @@
                 <a:latin typeface="Source Sans Pro"/>
                 <a:ea typeface="Source Sans Pro"/>
               </a:rPr>
-              <a:t>1</a:t>
+              <a:t>&lt;number&gt;</a:t>
             </a:fld>
             <a:endParaRPr b="0" lang="de-DE" sz="980" spc="-1" strike="noStrike">
               <a:latin typeface="Arial"/>
@@ -8480,7 +9796,7 @@
         <p:spPr>
           <a:xfrm>
             <a:off x="144000" y="1268640"/>
-            <a:ext cx="8747640" cy="4853880"/>
+            <a:ext cx="8746920" cy="4853160"/>
           </a:xfrm>
           <a:prstGeom prst="rect">
             <a:avLst/>
@@ -8499,7 +9815,7 @@
         <p:txBody>
           <a:bodyPr lIns="90000" rIns="90000" tIns="45000" bIns="45000"/>
           <a:p>
-            <a:pPr marL="257040" indent="-255960">
+            <a:pPr marL="257040" indent="-255240">
               <a:lnSpc>
                 <a:spcPct val="100000"/>
               </a:lnSpc>
@@ -8525,7 +9841,7 @@
             </a:endParaRPr>
           </a:p>
           <a:p>
-            <a:pPr lvl="1" marL="864000" indent="-323280">
+            <a:pPr lvl="1" marL="864000" indent="-322560">
               <a:lnSpc>
                 <a:spcPct val="100000"/>
               </a:lnSpc>
@@ -8556,7 +9872,7 @@
             </a:endParaRPr>
           </a:p>
           <a:p>
-            <a:pPr marL="257040" indent="-255960">
+            <a:pPr marL="257040" indent="-255240">
               <a:lnSpc>
                 <a:spcPct val="100000"/>
               </a:lnSpc>
@@ -8582,7 +9898,7 @@
             </a:endParaRPr>
           </a:p>
           <a:p>
-            <a:pPr lvl="1" marL="864000" indent="-323280">
+            <a:pPr lvl="1" marL="864000" indent="-322560">
               <a:lnSpc>
                 <a:spcPct val="100000"/>
               </a:lnSpc>
@@ -8643,7 +9959,7 @@
             </a:endParaRPr>
           </a:p>
           <a:p>
-            <a:pPr lvl="1" marL="864000" indent="-323280">
+            <a:pPr lvl="1" marL="864000" indent="-322560">
               <a:lnSpc>
                 <a:spcPct val="100000"/>
               </a:lnSpc>
@@ -8704,7 +10020,7 @@
             </a:endParaRPr>
           </a:p>
           <a:p>
-            <a:pPr marL="257040" indent="-255960">
+            <a:pPr marL="257040" indent="-255240">
               <a:lnSpc>
                 <a:spcPct val="100000"/>
               </a:lnSpc>
@@ -8730,7 +10046,7 @@
             </a:endParaRPr>
           </a:p>
           <a:p>
-            <a:pPr lvl="1" marL="864000" indent="-323280">
+            <a:pPr lvl="1" marL="864000" indent="-322560">
               <a:lnSpc>
                 <a:spcPct val="100000"/>
               </a:lnSpc>
@@ -8784,7 +10100,7 @@
         <p:spPr>
           <a:xfrm>
             <a:off x="251640" y="6381360"/>
-            <a:ext cx="2132640" cy="286920"/>
+            <a:ext cx="2131920" cy="286200"/>
           </a:xfrm>
           <a:prstGeom prst="rect">
             <a:avLst/>
@@ -8808,7 +10124,7 @@
                 <a:spcPct val="100000"/>
               </a:lnSpc>
             </a:pPr>
-            <a:fld id="{8D71C60B-BC26-4DB9-9399-F6DF9AC8F726}" type="datetime1">
+            <a:fld id="{AFD23EE8-6515-4AAC-9A5F-CC272872CC52}" type="datetime1">
               <a:rPr b="0" lang="de-DE" sz="1400" spc="-1" strike="noStrike">
                 <a:solidFill>
                   <a:srgbClr val="3d3d3d"/>
@@ -8816,7 +10132,7 @@
                 <a:latin typeface="Calibri"/>
                 <a:ea typeface="Source Sans Pro"/>
               </a:rPr>
-              <a:t>02.04.2019</a:t>
+              <a:t>03.01.-0001</a:t>
             </a:fld>
             <a:endParaRPr b="0" lang="de-DE" sz="1400" spc="-1" strike="noStrike">
               <a:latin typeface="Arial"/>
@@ -8833,7 +10149,7 @@
         <p:spPr>
           <a:xfrm>
             <a:off x="2910960" y="258840"/>
-            <a:ext cx="5755680" cy="504720"/>
+            <a:ext cx="5754960" cy="504000"/>
           </a:xfrm>
           <a:prstGeom prst="rect">
             <a:avLst/>
@@ -8933,7 +10249,7 @@
         <p:spPr>
           <a:xfrm>
             <a:off x="6553080" y="6381360"/>
-            <a:ext cx="2338200" cy="286920"/>
+            <a:ext cx="2337480" cy="286200"/>
           </a:xfrm>
           <a:prstGeom prst="rect">
             <a:avLst/>
@@ -8957,7 +10273,7 @@
                 <a:spcPct val="100000"/>
               </a:lnSpc>
             </a:pPr>
-            <a:fld id="{CEC38130-12A2-461D-974D-A5831D986206}" type="slidenum">
+            <a:fld id="{763A8226-B464-4A40-BF74-E682E7712647}" type="slidenum">
               <a:rPr b="0" lang="de-DE" sz="980" spc="-1" strike="noStrike">
                 <a:solidFill>
                   <a:srgbClr val="515151"/>
@@ -8965,7 +10281,7 @@
                 <a:latin typeface="Source Sans Pro"/>
                 <a:ea typeface="Source Sans Pro"/>
               </a:rPr>
-              <a:t>1</a:t>
+              <a:t>&lt;number&gt;</a:t>
             </a:fld>
             <a:endParaRPr b="0" lang="de-DE" sz="980" spc="-1" strike="noStrike">
               <a:latin typeface="Arial"/>
@@ -8982,7 +10298,7 @@
         <p:spPr>
           <a:xfrm>
             <a:off x="251280" y="1538640"/>
-            <a:ext cx="8640000" cy="4853880"/>
+            <a:ext cx="8639280" cy="4853160"/>
           </a:xfrm>
           <a:prstGeom prst="rect">
             <a:avLst/>
@@ -9001,7 +10317,7 @@
         <p:txBody>
           <a:bodyPr lIns="90000" rIns="90000" tIns="45000" bIns="45000"/>
           <a:p>
-            <a:pPr marL="257040" indent="-255960">
+            <a:pPr marL="257040" indent="-255240">
               <a:lnSpc>
                 <a:spcPct val="100000"/>
               </a:lnSpc>
@@ -9047,7 +10363,7 @@
             </a:endParaRPr>
           </a:p>
           <a:p>
-            <a:pPr lvl="1" marL="864000" indent="-323280">
+            <a:pPr lvl="1" marL="864000" indent="-322560">
               <a:lnSpc>
                 <a:spcPct val="100000"/>
               </a:lnSpc>
@@ -9076,7 +10392,7 @@
             </a:endParaRPr>
           </a:p>
           <a:p>
-            <a:pPr marL="257040" indent="-255960">
+            <a:pPr marL="257040" indent="-255240">
               <a:lnSpc>
                 <a:spcPct val="100000"/>
               </a:lnSpc>
@@ -9102,7 +10418,7 @@
             </a:endParaRPr>
           </a:p>
           <a:p>
-            <a:pPr lvl="1" marL="864000" indent="-323280">
+            <a:pPr lvl="1" marL="864000" indent="-322560">
               <a:lnSpc>
                 <a:spcPct val="100000"/>
               </a:lnSpc>
@@ -9171,7 +10487,7 @@
             </a:endParaRPr>
           </a:p>
           <a:p>
-            <a:pPr lvl="1" marL="864000" indent="-323280">
+            <a:pPr lvl="1" marL="864000" indent="-322560">
               <a:lnSpc>
                 <a:spcPct val="100000"/>
               </a:lnSpc>
@@ -9200,7 +10516,7 @@
             </a:endParaRPr>
           </a:p>
           <a:p>
-            <a:pPr lvl="1" marL="864000" indent="-323280">
+            <a:pPr lvl="1" marL="864000" indent="-322560">
               <a:lnSpc>
                 <a:spcPct val="100000"/>
               </a:lnSpc>
@@ -9229,7 +10545,7 @@
             </a:endParaRPr>
           </a:p>
           <a:p>
-            <a:pPr marL="257040" indent="-255960">
+            <a:pPr marL="257040" indent="-255240">
               <a:lnSpc>
                 <a:spcPct val="100000"/>
               </a:lnSpc>
@@ -9255,7 +10571,7 @@
             </a:endParaRPr>
           </a:p>
           <a:p>
-            <a:pPr lvl="1" marL="864000" indent="-323280">
+            <a:pPr lvl="1" marL="864000" indent="-322560">
               <a:lnSpc>
                 <a:spcPct val="100000"/>
               </a:lnSpc>
@@ -9284,7 +10600,7 @@
             </a:endParaRPr>
           </a:p>
           <a:p>
-            <a:pPr lvl="1" marL="864000" indent="-323280">
+            <a:pPr lvl="1" marL="864000" indent="-322560">
               <a:lnSpc>
                 <a:spcPct val="100000"/>
               </a:lnSpc>
@@ -9323,7 +10639,7 @@
         <p:spPr>
           <a:xfrm>
             <a:off x="251640" y="6381360"/>
-            <a:ext cx="2132640" cy="286920"/>
+            <a:ext cx="2131920" cy="286200"/>
           </a:xfrm>
           <a:prstGeom prst="rect">
             <a:avLst/>
@@ -9347,7 +10663,7 @@
                 <a:spcPct val="100000"/>
               </a:lnSpc>
             </a:pPr>
-            <a:fld id="{F78EC746-466A-4867-A991-B31AB2A644C0}" type="datetime1">
+            <a:fld id="{441A9AC6-100B-41B0-BD84-C3A984C33938}" type="datetime1">
               <a:rPr b="0" lang="de-DE" sz="1400" spc="-1" strike="noStrike">
                 <a:solidFill>
                   <a:srgbClr val="3d3d3d"/>
@@ -9355,7 +10671,7 @@
                 <a:latin typeface="Calibri"/>
                 <a:ea typeface="Source Sans Pro"/>
               </a:rPr>
-              <a:t>02.04.2019</a:t>
+              <a:t>05.04.2019</a:t>
             </a:fld>
             <a:endParaRPr b="0" lang="de-DE" sz="1400" spc="-1" strike="noStrike">
               <a:latin typeface="Arial"/>
@@ -9372,7 +10688,7 @@
         <p:spPr>
           <a:xfrm>
             <a:off x="2910960" y="771840"/>
-            <a:ext cx="5755680" cy="504720"/>
+            <a:ext cx="5754960" cy="504000"/>
           </a:xfrm>
           <a:prstGeom prst="rect">
             <a:avLst/>
@@ -9425,7 +10741,7 @@
         <p:spPr>
           <a:xfrm>
             <a:off x="6737040" y="2908800"/>
-            <a:ext cx="1547280" cy="503280"/>
+            <a:ext cx="1546560" cy="502560"/>
           </a:xfrm>
           <a:prstGeom prst="rect">
             <a:avLst/>
@@ -9448,7 +10764,7 @@
         <p:spPr>
           <a:xfrm>
             <a:off x="6591600" y="3546000"/>
-            <a:ext cx="1943280" cy="529920"/>
+            <a:ext cx="1942560" cy="529200"/>
           </a:xfrm>
           <a:prstGeom prst="rect">
             <a:avLst/>
@@ -9471,7 +10787,7 @@
         <p:spPr>
           <a:xfrm>
             <a:off x="3047760" y="195480"/>
-            <a:ext cx="3236040" cy="661320"/>
+            <a:ext cx="3235320" cy="660600"/>
           </a:xfrm>
           <a:prstGeom prst="rect">
             <a:avLst/>
@@ -9539,7 +10855,7 @@
         <p:spPr>
           <a:xfrm>
             <a:off x="6553080" y="6381360"/>
-            <a:ext cx="2338200" cy="286920"/>
+            <a:ext cx="2337480" cy="286200"/>
           </a:xfrm>
           <a:prstGeom prst="rect">
             <a:avLst/>
@@ -9563,7 +10879,7 @@
                 <a:spcPct val="100000"/>
               </a:lnSpc>
             </a:pPr>
-            <a:fld id="{8D685CB3-23A8-4D55-8221-DF8ACAA66801}" type="slidenum">
+            <a:fld id="{E8FDB40C-BCD5-43BA-8E76-0EB978E401D3}" type="slidenum">
               <a:rPr b="0" lang="de-DE" sz="980" spc="-1" strike="noStrike">
                 <a:solidFill>
                   <a:srgbClr val="515151"/>
@@ -9571,7 +10887,7 @@
                 <a:latin typeface="Source Sans Pro"/>
                 <a:ea typeface="Source Sans Pro"/>
               </a:rPr>
-              <a:t>1</a:t>
+              <a:t>&lt;number&gt;</a:t>
             </a:fld>
             <a:endParaRPr b="0" lang="de-DE" sz="980" spc="-1" strike="noStrike">
               <a:latin typeface="Arial"/>
@@ -9588,7 +10904,7 @@
         <p:spPr>
           <a:xfrm>
             <a:off x="251640" y="1268640"/>
-            <a:ext cx="8640000" cy="4853880"/>
+            <a:ext cx="8639280" cy="4853160"/>
           </a:xfrm>
           <a:prstGeom prst="rect">
             <a:avLst/>
@@ -9607,7 +10923,7 @@
         <p:txBody>
           <a:bodyPr lIns="90000" rIns="90000" tIns="45000" bIns="45000"/>
           <a:p>
-            <a:pPr marL="257040" indent="-255960">
+            <a:pPr marL="257040" indent="-255240">
               <a:lnSpc>
                 <a:spcPct val="100000"/>
               </a:lnSpc>
@@ -9633,7 +10949,7 @@
             </a:endParaRPr>
           </a:p>
           <a:p>
-            <a:pPr marL="257040" indent="-255960">
+            <a:pPr marL="257040" indent="-255240">
               <a:lnSpc>
                 <a:spcPct val="100000"/>
               </a:lnSpc>
@@ -9659,7 +10975,7 @@
             </a:endParaRPr>
           </a:p>
           <a:p>
-            <a:pPr lvl="1" marL="864000" indent="-323280">
+            <a:pPr lvl="1" marL="864000" indent="-322560">
               <a:lnSpc>
                 <a:spcPct val="100000"/>
               </a:lnSpc>
@@ -9688,7 +11004,7 @@
             </a:endParaRPr>
           </a:p>
           <a:p>
-            <a:pPr marL="257040" indent="-255960">
+            <a:pPr marL="257040" indent="-255240">
               <a:lnSpc>
                 <a:spcPct val="100000"/>
               </a:lnSpc>
@@ -9714,7 +11030,7 @@
             </a:endParaRPr>
           </a:p>
           <a:p>
-            <a:pPr lvl="1" marL="864000" indent="-323280">
+            <a:pPr lvl="1" marL="864000" indent="-322560">
               <a:lnSpc>
                 <a:spcPct val="100000"/>
               </a:lnSpc>
@@ -9743,7 +11059,7 @@
             </a:endParaRPr>
           </a:p>
           <a:p>
-            <a:pPr marL="257040" indent="-255960">
+            <a:pPr marL="257040" indent="-255240">
               <a:lnSpc>
                 <a:spcPct val="100000"/>
               </a:lnSpc>
@@ -9769,7 +11085,7 @@
             </a:endParaRPr>
           </a:p>
           <a:p>
-            <a:pPr lvl="1" marL="864000" indent="-323280">
+            <a:pPr lvl="1" marL="864000" indent="-322560">
               <a:lnSpc>
                 <a:spcPct val="100000"/>
               </a:lnSpc>
@@ -9798,7 +11114,7 @@
             </a:endParaRPr>
           </a:p>
           <a:p>
-            <a:pPr marL="257040" indent="-255960">
+            <a:pPr marL="257040" indent="-255240">
               <a:lnSpc>
                 <a:spcPct val="100000"/>
               </a:lnSpc>
@@ -9824,7 +11140,7 @@
             </a:endParaRPr>
           </a:p>
           <a:p>
-            <a:pPr lvl="1" marL="864000" indent="-323280">
+            <a:pPr lvl="1" marL="864000" indent="-322560">
               <a:lnSpc>
                 <a:spcPct val="100000"/>
               </a:lnSpc>
@@ -9873,7 +11189,7 @@
             </a:endParaRPr>
           </a:p>
           <a:p>
-            <a:pPr lvl="1" marL="864000" indent="-323280">
+            <a:pPr lvl="1" marL="864000" indent="-322560">
               <a:lnSpc>
                 <a:spcPct val="100000"/>
               </a:lnSpc>
@@ -9932,7 +11248,7 @@
         <p:spPr>
           <a:xfrm>
             <a:off x="251640" y="6381360"/>
-            <a:ext cx="2132640" cy="286920"/>
+            <a:ext cx="2131920" cy="286200"/>
           </a:xfrm>
           <a:prstGeom prst="rect">
             <a:avLst/>
@@ -9956,7 +11272,7 @@
                 <a:spcPct val="100000"/>
               </a:lnSpc>
             </a:pPr>
-            <a:fld id="{CADD3C5E-F3B1-4C03-8FD8-426CD111A805}" type="datetime1">
+            <a:fld id="{C79A2F4E-95E1-4956-88D4-F6577BBF9A49}" type="datetime1">
               <a:rPr b="0" lang="de-DE" sz="1400" spc="-1" strike="noStrike">
                 <a:solidFill>
                   <a:srgbClr val="3d3d3d"/>
@@ -9964,7 +11280,7 @@
                 <a:latin typeface="Calibri"/>
                 <a:ea typeface="Source Sans Pro"/>
               </a:rPr>
-              <a:t>02.04.2019</a:t>
+              <a:t>05.04.2019</a:t>
             </a:fld>
             <a:endParaRPr b="0" lang="de-DE" sz="1400" spc="-1" strike="noStrike">
               <a:latin typeface="Arial"/>
@@ -9981,7 +11297,7 @@
         <p:spPr>
           <a:xfrm>
             <a:off x="2910960" y="258840"/>
-            <a:ext cx="5755680" cy="504720"/>
+            <a:ext cx="5754960" cy="504000"/>
           </a:xfrm>
           <a:prstGeom prst="rect">
             <a:avLst/>
@@ -10081,7 +11397,7 @@
         <p:spPr>
           <a:xfrm>
             <a:off x="6553080" y="6381360"/>
-            <a:ext cx="2338200" cy="286920"/>
+            <a:ext cx="2337480" cy="286200"/>
           </a:xfrm>
           <a:prstGeom prst="rect">
             <a:avLst/>
@@ -10105,7 +11421,7 @@
                 <a:spcPct val="100000"/>
               </a:lnSpc>
             </a:pPr>
-            <a:fld id="{66A805F9-4B87-4E51-A2A2-D26A83281A78}" type="slidenum">
+            <a:fld id="{3BAC049E-1D8F-401F-8209-FC5C28B89E3F}" type="slidenum">
               <a:rPr b="0" lang="de-DE" sz="980" spc="-1" strike="noStrike">
                 <a:solidFill>
                   <a:srgbClr val="515151"/>
@@ -10113,7 +11429,7 @@
                 <a:latin typeface="Source Sans Pro"/>
                 <a:ea typeface="Source Sans Pro"/>
               </a:rPr>
-              <a:t>1</a:t>
+              <a:t>&lt;number&gt;</a:t>
             </a:fld>
             <a:endParaRPr b="0" lang="de-DE" sz="980" spc="-1" strike="noStrike">
               <a:latin typeface="Arial"/>
@@ -10134,7 +11450,7 @@
         <p:spPr>
           <a:xfrm>
             <a:off x="540000" y="864000"/>
-            <a:ext cx="8135280" cy="5474160"/>
+            <a:ext cx="8134560" cy="5473440"/>
           </a:xfrm>
           <a:prstGeom prst="rect">
             <a:avLst/>
@@ -10153,7 +11469,7 @@
         <p:spPr>
           <a:xfrm>
             <a:off x="251640" y="6381360"/>
-            <a:ext cx="2132640" cy="286920"/>
+            <a:ext cx="2131920" cy="286200"/>
           </a:xfrm>
           <a:prstGeom prst="rect">
             <a:avLst/>
@@ -10177,7 +11493,7 @@
                 <a:spcPct val="100000"/>
               </a:lnSpc>
             </a:pPr>
-            <a:fld id="{DA5663EA-3748-48E1-852C-A3D41A3EA7A8}" type="datetime1">
+            <a:fld id="{29CBA53B-82C2-40C8-A8E5-703DC4EDFD22}" type="datetime1">
               <a:rPr b="0" lang="de-DE" sz="1400" spc="-1" strike="noStrike">
                 <a:solidFill>
                   <a:srgbClr val="3d3d3d"/>
@@ -10185,7 +11501,7 @@
                 <a:latin typeface="Calibri"/>
                 <a:ea typeface="Source Sans Pro"/>
               </a:rPr>
-              <a:t>02.04.2019</a:t>
+              <a:t>05.04.2019</a:t>
             </a:fld>
             <a:endParaRPr b="0" lang="de-DE" sz="1400" spc="-1" strike="noStrike">
               <a:latin typeface="Arial"/>
@@ -10202,7 +11518,7 @@
         <p:spPr>
           <a:xfrm>
             <a:off x="2910960" y="258840"/>
-            <a:ext cx="5755680" cy="504720"/>
+            <a:ext cx="5754960" cy="504000"/>
           </a:xfrm>
           <a:prstGeom prst="rect">
             <a:avLst/>
@@ -10302,7 +11618,7 @@
         <p:spPr>
           <a:xfrm>
             <a:off x="6553080" y="6381360"/>
-            <a:ext cx="2338200" cy="286920"/>
+            <a:ext cx="2337480" cy="286200"/>
           </a:xfrm>
           <a:prstGeom prst="rect">
             <a:avLst/>
@@ -10326,7 +11642,7 @@
                 <a:spcPct val="100000"/>
               </a:lnSpc>
             </a:pPr>
-            <a:fld id="{D68F6313-0CB9-42E2-9CAA-6F4896C904A5}" type="slidenum">
+            <a:fld id="{8243CED0-7124-44D7-A1A5-8B79D4899737}" type="slidenum">
               <a:rPr b="0" lang="de-DE" sz="980" spc="-1" strike="noStrike">
                 <a:solidFill>
                   <a:srgbClr val="515151"/>
@@ -10334,7 +11650,7 @@
                 <a:latin typeface="Source Sans Pro"/>
                 <a:ea typeface="Source Sans Pro"/>
               </a:rPr>
-              <a:t>1</a:t>
+              <a:t>&lt;number&gt;</a:t>
             </a:fld>
             <a:endParaRPr b="0" lang="de-DE" sz="980" spc="-1" strike="noStrike">
               <a:latin typeface="Arial"/>
@@ -10351,7 +11667,7 @@
         <p:spPr>
           <a:xfrm>
             <a:off x="216000" y="1332000"/>
-            <a:ext cx="8855280" cy="4853880"/>
+            <a:ext cx="8854560" cy="4853160"/>
           </a:xfrm>
           <a:prstGeom prst="rect">
             <a:avLst/>
@@ -10370,7 +11686,7 @@
         <p:txBody>
           <a:bodyPr lIns="90000" rIns="90000" tIns="45000" bIns="45000"/>
           <a:p>
-            <a:pPr marL="257040" indent="-255960">
+            <a:pPr marL="257040" indent="-255240">
               <a:lnSpc>
                 <a:spcPct val="100000"/>
               </a:lnSpc>
@@ -10396,7 +11712,7 @@
             </a:endParaRPr>
           </a:p>
           <a:p>
-            <a:pPr lvl="1" marL="864000" indent="-323280">
+            <a:pPr lvl="1" marL="864000" indent="-322560">
               <a:lnSpc>
                 <a:spcPct val="100000"/>
               </a:lnSpc>
@@ -10425,7 +11741,7 @@
             </a:endParaRPr>
           </a:p>
           <a:p>
-            <a:pPr lvl="1" marL="864000" indent="-323280">
+            <a:pPr lvl="1" marL="864000" indent="-322560">
               <a:lnSpc>
                 <a:spcPct val="100000"/>
               </a:lnSpc>
@@ -10454,7 +11770,7 @@
             </a:endParaRPr>
           </a:p>
           <a:p>
-            <a:pPr marL="257040" indent="-255960">
+            <a:pPr marL="257040" indent="-255240">
               <a:lnSpc>
                 <a:spcPct val="100000"/>
               </a:lnSpc>
@@ -10520,7 +11836,7 @@
             </a:endParaRPr>
           </a:p>
           <a:p>
-            <a:pPr lvl="1" marL="864000" indent="-323280">
+            <a:pPr lvl="1" marL="864000" indent="-322560">
               <a:lnSpc>
                 <a:spcPct val="100000"/>
               </a:lnSpc>
@@ -10599,7 +11915,7 @@
             </a:endParaRPr>
           </a:p>
           <a:p>
-            <a:pPr lvl="1" marL="864000" indent="-323280">
+            <a:pPr lvl="1" marL="864000" indent="-322560">
               <a:lnSpc>
                 <a:spcPct val="100000"/>
               </a:lnSpc>
@@ -10628,7 +11944,7 @@
             </a:endParaRPr>
           </a:p>
           <a:p>
-            <a:pPr lvl="1" marL="864000" indent="-323280">
+            <a:pPr lvl="1" marL="864000" indent="-322560">
               <a:lnSpc>
                 <a:spcPct val="100000"/>
               </a:lnSpc>
@@ -10680,7 +11996,7 @@
         <p:spPr>
           <a:xfrm>
             <a:off x="251640" y="6381360"/>
-            <a:ext cx="2132640" cy="286920"/>
+            <a:ext cx="2131920" cy="286200"/>
           </a:xfrm>
           <a:prstGeom prst="rect">
             <a:avLst/>
@@ -10704,7 +12020,7 @@
                 <a:spcPct val="100000"/>
               </a:lnSpc>
             </a:pPr>
-            <a:fld id="{8766F821-808C-4DD8-9DC3-4B818BC78F18}" type="datetime1">
+            <a:fld id="{07626A8F-8B7B-4947-AD5B-EFA64F629AE2}" type="datetime1">
               <a:rPr b="0" lang="de-DE" sz="1400" spc="-1" strike="noStrike">
                 <a:solidFill>
                   <a:srgbClr val="3d3d3d"/>
@@ -10712,7 +12028,7 @@
                 <a:latin typeface="Calibri"/>
                 <a:ea typeface="Source Sans Pro"/>
               </a:rPr>
-              <a:t>02.04.2019</a:t>
+              <a:t>05.04.2019</a:t>
             </a:fld>
             <a:endParaRPr b="0" lang="de-DE" sz="1400" spc="-1" strike="noStrike">
               <a:latin typeface="Arial"/>
@@ -10729,7 +12045,7 @@
         <p:spPr>
           <a:xfrm>
             <a:off x="2910960" y="258840"/>
-            <a:ext cx="5755680" cy="504720"/>
+            <a:ext cx="5754960" cy="504000"/>
           </a:xfrm>
           <a:prstGeom prst="rect">
             <a:avLst/>
@@ -10829,7 +12145,7 @@
         <p:spPr>
           <a:xfrm>
             <a:off x="6553080" y="6381360"/>
-            <a:ext cx="2338200" cy="286920"/>
+            <a:ext cx="2337480" cy="286200"/>
           </a:xfrm>
           <a:prstGeom prst="rect">
             <a:avLst/>
@@ -10853,7 +12169,7 @@
                 <a:spcPct val="100000"/>
               </a:lnSpc>
             </a:pPr>
-            <a:fld id="{7770C460-7863-4051-A3EA-9325A8C61C59}" type="slidenum">
+            <a:fld id="{BB7C9A23-32AA-4C25-9711-E74F2989B1FE}" type="slidenum">
               <a:rPr b="0" lang="de-DE" sz="980" spc="-1" strike="noStrike">
                 <a:solidFill>
                   <a:srgbClr val="515151"/>
@@ -10861,7 +12177,7 @@
                 <a:latin typeface="Source Sans Pro"/>
                 <a:ea typeface="Source Sans Pro"/>
               </a:rPr>
-              <a:t>1</a:t>
+              <a:t>&lt;number&gt;</a:t>
             </a:fld>
             <a:endParaRPr b="0" lang="de-DE" sz="980" spc="-1" strike="noStrike">
               <a:latin typeface="Arial"/>
@@ -10878,7 +12194,7 @@
         <p:spPr>
           <a:xfrm>
             <a:off x="251640" y="1268640"/>
-            <a:ext cx="8640000" cy="4853880"/>
+            <a:ext cx="8639280" cy="4853160"/>
           </a:xfrm>
           <a:prstGeom prst="rect">
             <a:avLst/>
@@ -10904,7 +12220,7 @@
         <p:spPr>
           <a:xfrm>
             <a:off x="251640" y="6381360"/>
-            <a:ext cx="2132640" cy="286920"/>
+            <a:ext cx="2131920" cy="286200"/>
           </a:xfrm>
           <a:prstGeom prst="rect">
             <a:avLst/>
@@ -10928,7 +12244,7 @@
                 <a:spcPct val="100000"/>
               </a:lnSpc>
             </a:pPr>
-            <a:fld id="{143EBF76-0659-4E3F-B905-DF8FEA64058C}" type="datetime1">
+            <a:fld id="{48A66B1C-8726-456D-B6C0-6B559D9F3A16}" type="datetime1">
               <a:rPr b="0" lang="de-DE" sz="1400" spc="-1" strike="noStrike">
                 <a:solidFill>
                   <a:srgbClr val="3d3d3d"/>
@@ -10936,7 +12252,7 @@
                 <a:latin typeface="Calibri"/>
                 <a:ea typeface="Source Sans Pro"/>
               </a:rPr>
-              <a:t>02.04.2019</a:t>
+              <a:t>05.04.2019</a:t>
             </a:fld>
             <a:endParaRPr b="0" lang="de-DE" sz="1400" spc="-1" strike="noStrike">
               <a:latin typeface="Arial"/>
@@ -10953,7 +12269,7 @@
         <p:spPr>
           <a:xfrm>
             <a:off x="2910960" y="258840"/>
-            <a:ext cx="5755680" cy="504720"/>
+            <a:ext cx="5754960" cy="504000"/>
           </a:xfrm>
           <a:prstGeom prst="rect">
             <a:avLst/>
@@ -11009,7 +12325,7 @@
         <p:spPr>
           <a:xfrm>
             <a:off x="-592200" y="1163520"/>
-            <a:ext cx="5540760" cy="1870560"/>
+            <a:ext cx="5540040" cy="1869840"/>
           </a:xfrm>
           <a:prstGeom prst="rect">
             <a:avLst/>
@@ -11032,7 +12348,7 @@
         <p:spPr>
           <a:xfrm>
             <a:off x="522000" y="1241280"/>
-            <a:ext cx="1227600" cy="848160"/>
+            <a:ext cx="1226880" cy="847440"/>
           </a:xfrm>
           <a:prstGeom prst="rect">
             <a:avLst/>
@@ -11055,7 +12371,7 @@
         <p:spPr>
           <a:xfrm>
             <a:off x="245880" y="1665360"/>
-            <a:ext cx="1227600" cy="848160"/>
+            <a:ext cx="1226880" cy="847440"/>
           </a:xfrm>
           <a:prstGeom prst="rect">
             <a:avLst/>
@@ -11074,7 +12390,7 @@
         <p:spPr>
           <a:xfrm>
             <a:off x="2028600" y="1928880"/>
-            <a:ext cx="646560" cy="468720"/>
+            <a:ext cx="645840" cy="468000"/>
           </a:xfrm>
           <a:prstGeom prst="leftRightArrow">
             <a:avLst>
@@ -11127,7 +12443,7 @@
         <p:spPr>
           <a:xfrm>
             <a:off x="644400" y="2187720"/>
-            <a:ext cx="1229400" cy="846720"/>
+            <a:ext cx="1228680" cy="846000"/>
           </a:xfrm>
           <a:prstGeom prst="rect">
             <a:avLst/>
@@ -11150,7 +12466,7 @@
         <p:spPr>
           <a:xfrm>
             <a:off x="5486400" y="1638360"/>
-            <a:ext cx="1221120" cy="916560"/>
+            <a:ext cx="1220400" cy="915840"/>
           </a:xfrm>
           <a:prstGeom prst="rect">
             <a:avLst/>
@@ -11169,9 +12485,9 @@
         <p:grpSpPr>
           <a:xfrm>
             <a:off x="7502400" y="1552680"/>
-            <a:ext cx="1596960" cy="1296360"/>
+            <a:ext cx="1596240" cy="1295280"/>
             <a:chOff x="7502400" y="1552680"/>
-            <a:chExt cx="1596960" cy="1296360"/>
+            <a:chExt cx="1596240" cy="1295280"/>
           </a:xfrm>
         </p:grpSpPr>
         <p:pic>
@@ -11188,7 +12504,7 @@
           <p:spPr>
             <a:xfrm>
               <a:off x="7502400" y="1552680"/>
-              <a:ext cx="1404720" cy="1056600"/>
+              <a:ext cx="1404000" cy="1055880"/>
             </a:xfrm>
             <a:prstGeom prst="rect">
               <a:avLst/>
@@ -11206,8 +12522,8 @@
           </p:nvSpPr>
           <p:spPr>
             <a:xfrm rot="3289800">
-              <a:off x="8646480" y="2312280"/>
-              <a:ext cx="302400" cy="524160"/>
+              <a:off x="8646840" y="2311920"/>
+              <a:ext cx="301680" cy="523440"/>
             </a:xfrm>
             <a:prstGeom prst="rtTriangle">
               <a:avLst/>
@@ -11243,7 +12559,7 @@
         <p:spPr>
           <a:xfrm>
             <a:off x="6813360" y="1893960"/>
-            <a:ext cx="687960" cy="467280"/>
+            <a:ext cx="687240" cy="466560"/>
           </a:xfrm>
           <a:prstGeom prst="leftRightArrow">
             <a:avLst>
@@ -11291,10 +12607,10 @@
         </p:nvGrpSpPr>
         <p:grpSpPr>
           <a:xfrm>
-            <a:off x="4115160" y="3335400"/>
-            <a:ext cx="4930920" cy="2942280"/>
-            <a:chOff x="4115160" y="3335400"/>
-            <a:chExt cx="4930920" cy="2942280"/>
+            <a:off x="4114080" y="3335400"/>
+            <a:ext cx="4931280" cy="2941560"/>
+            <a:chOff x="4114080" y="3335400"/>
+            <a:chExt cx="4931280" cy="2941560"/>
           </a:xfrm>
         </p:grpSpPr>
         <p:pic>
@@ -11310,7 +12626,7 @@
           <p:spPr>
             <a:xfrm>
               <a:off x="4403520" y="4270680"/>
-              <a:ext cx="1365840" cy="1326240"/>
+              <a:ext cx="1365120" cy="1325520"/>
             </a:xfrm>
             <a:prstGeom prst="rect">
               <a:avLst/>
@@ -11333,7 +12649,7 @@
           <p:spPr>
             <a:xfrm>
               <a:off x="5843520" y="3335400"/>
-              <a:ext cx="1583280" cy="1110240"/>
+              <a:ext cx="1582560" cy="1109520"/>
             </a:xfrm>
             <a:prstGeom prst="rect">
               <a:avLst/>
@@ -11351,8 +12667,8 @@
           </p:nvSpPr>
           <p:spPr>
             <a:xfrm flipV="1" rot="11274000">
-              <a:off x="5122080" y="3819600"/>
-              <a:ext cx="862560" cy="1081080"/>
+              <a:off x="5122800" y="3818880"/>
+              <a:ext cx="861840" cy="1080360"/>
             </a:xfrm>
             <a:custGeom>
               <a:avLst/>
@@ -11434,7 +12750,7 @@
           <p:spPr>
             <a:xfrm>
               <a:off x="7427880" y="3335400"/>
-              <a:ext cx="1222920" cy="424440"/>
+              <a:ext cx="1222200" cy="423720"/>
             </a:xfrm>
             <a:prstGeom prst="rect">
               <a:avLst/>
@@ -11488,7 +12804,7 @@
           <p:spPr>
             <a:xfrm>
               <a:off x="5865840" y="5251680"/>
-              <a:ext cx="3180240" cy="891360"/>
+              <a:ext cx="3179520" cy="890640"/>
             </a:xfrm>
             <a:prstGeom prst="rect">
               <a:avLst/>
@@ -11506,8 +12822,8 @@
           </p:nvSpPr>
           <p:spPr>
             <a:xfrm flipH="1" rot="4902000">
-              <a:off x="5301360" y="4668840"/>
-              <a:ext cx="862560" cy="1076760"/>
+              <a:off x="5300640" y="4669560"/>
+              <a:ext cx="861840" cy="1075320"/>
             </a:xfrm>
             <a:custGeom>
               <a:avLst/>
@@ -11589,7 +12905,7 @@
           <p:spPr>
             <a:xfrm>
               <a:off x="6419880" y="4991400"/>
-              <a:ext cx="1726200" cy="257040"/>
+              <a:ext cx="1725480" cy="256320"/>
             </a:xfrm>
             <a:prstGeom prst="rect">
               <a:avLst/>
@@ -11638,7 +12954,7 @@
           <p:spPr>
             <a:xfrm>
               <a:off x="4475160" y="5518440"/>
-              <a:ext cx="1222920" cy="759240"/>
+              <a:ext cx="1222200" cy="758520"/>
             </a:xfrm>
             <a:prstGeom prst="rect">
               <a:avLst/>
@@ -11686,8 +13002,8 @@
           </p:nvSpPr>
           <p:spPr>
             <a:xfrm flipH="1" flipV="1" rot="4069200">
-              <a:off x="4344840" y="5052960"/>
-              <a:ext cx="864000" cy="1077840"/>
+              <a:off x="4343400" y="5052240"/>
+              <a:ext cx="863280" cy="1076760"/>
             </a:xfrm>
             <a:custGeom>
               <a:avLst/>
@@ -11773,7 +13089,7 @@
           <p:spPr>
             <a:xfrm>
               <a:off x="6778440" y="3767040"/>
-              <a:ext cx="1352880" cy="1051560"/>
+              <a:ext cx="1352160" cy="1050840"/>
             </a:xfrm>
             <a:prstGeom prst="rect">
               <a:avLst/>
@@ -11799,7 +13115,7 @@
           <p:spPr>
             <a:xfrm>
               <a:off x="7788240" y="4270680"/>
-              <a:ext cx="1068840" cy="627840"/>
+              <a:ext cx="1068120" cy="627120"/>
             </a:xfrm>
             <a:prstGeom prst="rect">
               <a:avLst/>
@@ -11819,7 +13135,7 @@
         <p:spPr>
           <a:xfrm>
             <a:off x="53280" y="3308040"/>
-            <a:ext cx="4296600" cy="3009960"/>
+            <a:ext cx="4295880" cy="3009240"/>
           </a:xfrm>
           <a:prstGeom prst="rect">
             <a:avLst/>
@@ -12097,7 +13413,7 @@
         <p:spPr>
           <a:xfrm>
             <a:off x="6553080" y="6381360"/>
-            <a:ext cx="2338200" cy="286920"/>
+            <a:ext cx="2337480" cy="286200"/>
           </a:xfrm>
           <a:prstGeom prst="rect">
             <a:avLst/>
@@ -12121,7 +13437,7 @@
                 <a:spcPct val="100000"/>
               </a:lnSpc>
             </a:pPr>
-            <a:fld id="{81AE8D4E-6408-463D-A8A4-B4D03193366D}" type="slidenum">
+            <a:fld id="{E160893A-A30C-4026-B71B-E2A41E1A46F3}" type="slidenum">
               <a:rPr b="0" lang="de-DE" sz="980" spc="-1" strike="noStrike">
                 <a:solidFill>
                   <a:srgbClr val="515151"/>
@@ -12146,7 +13462,7 @@
         <p:spPr>
           <a:xfrm>
             <a:off x="251640" y="1268640"/>
-            <a:ext cx="8640000" cy="1492200"/>
+            <a:ext cx="8639280" cy="1491480"/>
           </a:xfrm>
           <a:prstGeom prst="rect">
             <a:avLst/>
@@ -12172,7 +13488,7 @@
         <p:spPr>
           <a:xfrm>
             <a:off x="251640" y="6381360"/>
-            <a:ext cx="2132640" cy="286920"/>
+            <a:ext cx="2131920" cy="286200"/>
           </a:xfrm>
           <a:prstGeom prst="rect">
             <a:avLst/>
@@ -12196,7 +13512,7 @@
                 <a:spcPct val="100000"/>
               </a:lnSpc>
             </a:pPr>
-            <a:fld id="{8F878DE1-B82A-467D-A5F0-34350397E941}" type="datetime1">
+            <a:fld id="{2CCE1372-B1E4-457E-B252-2AD587AD5484}" type="datetime1">
               <a:rPr b="0" lang="de-DE" sz="1400" spc="-1" strike="noStrike">
                 <a:solidFill>
                   <a:srgbClr val="3d3d3d"/>
@@ -12204,7 +13520,7 @@
                 <a:latin typeface="Calibri"/>
                 <a:ea typeface="Source Sans Pro"/>
               </a:rPr>
-              <a:t>02.04.2019</a:t>
+              <a:t>05.04.2019</a:t>
             </a:fld>
             <a:endParaRPr b="0" lang="de-DE" sz="1400" spc="-1" strike="noStrike">
               <a:latin typeface="Arial"/>
@@ -12221,7 +13537,7 @@
         <p:spPr>
           <a:xfrm>
             <a:off x="2910960" y="258840"/>
-            <a:ext cx="5755680" cy="504720"/>
+            <a:ext cx="5754960" cy="504000"/>
           </a:xfrm>
           <a:prstGeom prst="rect">
             <a:avLst/>
@@ -12272,7 +13588,7 @@
         <p:spPr>
           <a:xfrm>
             <a:off x="216000" y="900000"/>
-            <a:ext cx="8711640" cy="5392080"/>
+            <a:ext cx="8710920" cy="5391360"/>
           </a:xfrm>
           <a:prstGeom prst="rect">
             <a:avLst/>
@@ -12303,7 +13619,11 @@
             </a:pPr>
             <a:r>
               <a:rPr b="0" lang="de-DE" sz="1800" spc="-1" strike="noStrike">
+                <a:solidFill>
+                  <a:srgbClr val="000000"/>
+                </a:solidFill>
                 <a:latin typeface="Arial"/>
+                <a:ea typeface="DejaVu Sans"/>
               </a:rPr>
               <a:t>                                      </a:t>
             </a:r>
@@ -12529,7 +13849,11 @@
             </a:pPr>
             <a:r>
               <a:rPr b="0" lang="de-DE" sz="1200" spc="-1" strike="noStrike">
+                <a:solidFill>
+                  <a:srgbClr val="000000"/>
+                </a:solidFill>
                 <a:latin typeface="Arial"/>
+                <a:ea typeface="DejaVu Sans"/>
               </a:rPr>
               <a:t>Source: Sandro Fiore</a:t>
             </a:r>
@@ -12597,7 +13921,7 @@
         <p:spPr>
           <a:xfrm>
             <a:off x="5832000" y="1440000"/>
-            <a:ext cx="2735280" cy="647280"/>
+            <a:ext cx="2734560" cy="646560"/>
           </a:xfrm>
           <a:prstGeom prst="rect">
             <a:avLst/>

</xml_diff>